<commit_message>
Update Presentation pre-TPI Thierry Koetschet.pptx
</commit_message>
<xml_diff>
--- a/Presentation pre-TPI Thierry Koetschet.pptx
+++ b/Presentation pre-TPI Thierry Koetschet.pptx
@@ -1,9 +1,15 @@
 
 <file path=ppt/presentation.xml><?xml version="1.0" encoding="utf-8"?>
-<p:presentation xmlns:a="http://schemas.openxmlformats.org/drawingml/2006/main" xmlns:r="http://schemas.openxmlformats.org/officeDocument/2006/relationships" xmlns:p="http://schemas.openxmlformats.org/presentationml/2006/main" saveSubsetFonts="1">
+<p:presentation xmlns:a="http://schemas.openxmlformats.org/drawingml/2006/main" xmlns:r="http://schemas.openxmlformats.org/officeDocument/2006/relationships" xmlns:p="http://schemas.openxmlformats.org/presentationml/2006/main" showSpecialPlsOnTitleSld="0" saveSubsetFonts="1">
   <p:sldMasterIdLst>
     <p:sldMasterId id="2147483660" r:id="rId1"/>
   </p:sldMasterIdLst>
+  <p:notesMasterIdLst>
+    <p:notesMasterId r:id="rId20"/>
+  </p:notesMasterIdLst>
+  <p:handoutMasterIdLst>
+    <p:handoutMasterId r:id="rId21"/>
+  </p:handoutMasterIdLst>
   <p:sldIdLst>
     <p:sldId id="256" r:id="rId2"/>
     <p:sldId id="257" r:id="rId3"/>
@@ -14,11 +20,15 @@
     <p:sldId id="270" r:id="rId8"/>
     <p:sldId id="271" r:id="rId9"/>
     <p:sldId id="261" r:id="rId10"/>
-    <p:sldId id="262" r:id="rId11"/>
-    <p:sldId id="263" r:id="rId12"/>
-    <p:sldId id="264" r:id="rId13"/>
-    <p:sldId id="265" r:id="rId14"/>
-    <p:sldId id="266" r:id="rId15"/>
+    <p:sldId id="273" r:id="rId11"/>
+    <p:sldId id="274" r:id="rId12"/>
+    <p:sldId id="275" r:id="rId13"/>
+    <p:sldId id="262" r:id="rId14"/>
+    <p:sldId id="272" r:id="rId15"/>
+    <p:sldId id="263" r:id="rId16"/>
+    <p:sldId id="264" r:id="rId17"/>
+    <p:sldId id="265" r:id="rId18"/>
+    <p:sldId id="266" r:id="rId19"/>
   </p:sldIdLst>
   <p:sldSz cx="12192000" cy="6858000"/>
   <p:notesSz cx="6858000" cy="9144000"/>
@@ -117,7 +127,529 @@
       </a:defRPr>
     </a:lvl9pPr>
   </p:defaultTextStyle>
+  <p:extLst>
+    <p:ext uri="{EFAFB233-063F-42B5-8137-9DF3F51BA10A}">
+      <p15:sldGuideLst xmlns:p15="http://schemas.microsoft.com/office/powerpoint/2012/main"/>
+    </p:ext>
+  </p:extLst>
 </p:presentation>
+</file>
+
+<file path=ppt/handoutMasters/handoutMaster1.xml><?xml version="1.0" encoding="utf-8"?>
+<p:handoutMaster xmlns:a="http://schemas.openxmlformats.org/drawingml/2006/main" xmlns:r="http://schemas.openxmlformats.org/officeDocument/2006/relationships" xmlns:p="http://schemas.openxmlformats.org/presentationml/2006/main">
+  <p:cSld>
+    <p:bg>
+      <p:bgRef idx="1001">
+        <a:schemeClr val="bg1"/>
+      </p:bgRef>
+    </p:bg>
+    <p:spTree>
+      <p:nvGrpSpPr>
+        <p:cNvPr id="1" name=""/>
+        <p:cNvGrpSpPr/>
+        <p:nvPr/>
+      </p:nvGrpSpPr>
+      <p:grpSpPr>
+        <a:xfrm>
+          <a:off x="0" y="0"/>
+          <a:ext cx="0" cy="0"/>
+          <a:chOff x="0" y="0"/>
+          <a:chExt cx="0" cy="0"/>
+        </a:xfrm>
+      </p:grpSpPr>
+      <p:sp>
+        <p:nvSpPr>
+          <p:cNvPr id="2" name="Espace réservé de l'en-tête 1"/>
+          <p:cNvSpPr>
+            <a:spLocks noGrp="1"/>
+          </p:cNvSpPr>
+          <p:nvPr>
+            <p:ph type="hdr" sz="quarter"/>
+          </p:nvPr>
+        </p:nvSpPr>
+        <p:spPr>
+          <a:xfrm>
+            <a:off x="0" y="0"/>
+            <a:ext cx="2971800" cy="458788"/>
+          </a:xfrm>
+          <a:prstGeom prst="rect">
+            <a:avLst/>
+          </a:prstGeom>
+        </p:spPr>
+        <p:txBody>
+          <a:bodyPr vert="horz" lIns="91440" tIns="45720" rIns="91440" bIns="45720" rtlCol="0"/>
+          <a:lstStyle>
+            <a:lvl1pPr algn="l">
+              <a:defRPr sz="1200"/>
+            </a:lvl1pPr>
+          </a:lstStyle>
+          <a:p>
+            <a:endParaRPr lang="fr-CH"/>
+          </a:p>
+        </p:txBody>
+      </p:sp>
+      <p:sp>
+        <p:nvSpPr>
+          <p:cNvPr id="3" name="Espace réservé de la date 2"/>
+          <p:cNvSpPr>
+            <a:spLocks noGrp="1"/>
+          </p:cNvSpPr>
+          <p:nvPr>
+            <p:ph type="dt" sz="quarter" idx="1"/>
+          </p:nvPr>
+        </p:nvSpPr>
+        <p:spPr>
+          <a:xfrm>
+            <a:off x="3884613" y="0"/>
+            <a:ext cx="2971800" cy="458788"/>
+          </a:xfrm>
+          <a:prstGeom prst="rect">
+            <a:avLst/>
+          </a:prstGeom>
+        </p:spPr>
+        <p:txBody>
+          <a:bodyPr vert="horz" lIns="91440" tIns="45720" rIns="91440" bIns="45720" rtlCol="0"/>
+          <a:lstStyle>
+            <a:lvl1pPr algn="r">
+              <a:defRPr sz="1200"/>
+            </a:lvl1pPr>
+          </a:lstStyle>
+          <a:p>
+            <a:fld id="{9E0033D7-1504-4660-93E6-B5768C555536}" type="datetimeFigureOut">
+              <a:rPr lang="fr-CH" smtClean="0"/>
+              <a:t>30.03.2023</a:t>
+            </a:fld>
+            <a:endParaRPr lang="fr-CH"/>
+          </a:p>
+        </p:txBody>
+      </p:sp>
+      <p:sp>
+        <p:nvSpPr>
+          <p:cNvPr id="4" name="Espace réservé du pied de page 3"/>
+          <p:cNvSpPr>
+            <a:spLocks noGrp="1"/>
+          </p:cNvSpPr>
+          <p:nvPr>
+            <p:ph type="ftr" sz="quarter" idx="2"/>
+          </p:nvPr>
+        </p:nvSpPr>
+        <p:spPr>
+          <a:xfrm>
+            <a:off x="0" y="8685213"/>
+            <a:ext cx="2971800" cy="458787"/>
+          </a:xfrm>
+          <a:prstGeom prst="rect">
+            <a:avLst/>
+          </a:prstGeom>
+        </p:spPr>
+        <p:txBody>
+          <a:bodyPr vert="horz" lIns="91440" tIns="45720" rIns="91440" bIns="45720" rtlCol="0" anchor="b"/>
+          <a:lstStyle>
+            <a:lvl1pPr algn="l">
+              <a:defRPr sz="1200"/>
+            </a:lvl1pPr>
+          </a:lstStyle>
+          <a:p>
+            <a:endParaRPr lang="fr-CH"/>
+          </a:p>
+        </p:txBody>
+      </p:sp>
+      <p:sp>
+        <p:nvSpPr>
+          <p:cNvPr id="5" name="Espace réservé du numéro de diapositive 4"/>
+          <p:cNvSpPr>
+            <a:spLocks noGrp="1"/>
+          </p:cNvSpPr>
+          <p:nvPr>
+            <p:ph type="sldNum" sz="quarter" idx="3"/>
+          </p:nvPr>
+        </p:nvSpPr>
+        <p:spPr>
+          <a:xfrm>
+            <a:off x="3884613" y="8685213"/>
+            <a:ext cx="2971800" cy="458787"/>
+          </a:xfrm>
+          <a:prstGeom prst="rect">
+            <a:avLst/>
+          </a:prstGeom>
+        </p:spPr>
+        <p:txBody>
+          <a:bodyPr vert="horz" lIns="91440" tIns="45720" rIns="91440" bIns="45720" rtlCol="0" anchor="b"/>
+          <a:lstStyle>
+            <a:lvl1pPr algn="r">
+              <a:defRPr sz="1200"/>
+            </a:lvl1pPr>
+          </a:lstStyle>
+          <a:p>
+            <a:fld id="{F892F037-E338-416E-A2D4-37FCD25A9865}" type="slidenum">
+              <a:rPr lang="fr-CH" smtClean="0"/>
+              <a:t>‹N°›</a:t>
+            </a:fld>
+            <a:endParaRPr lang="fr-CH"/>
+          </a:p>
+        </p:txBody>
+      </p:sp>
+    </p:spTree>
+    <p:extLst>
+      <p:ext uri="{BB962C8B-B14F-4D97-AF65-F5344CB8AC3E}">
+        <p14:creationId xmlns:p14="http://schemas.microsoft.com/office/powerpoint/2010/main" val="1238172664"/>
+      </p:ext>
+    </p:extLst>
+  </p:cSld>
+  <p:clrMap bg1="lt1" tx1="dk1" bg2="lt2" tx2="dk2" accent1="accent1" accent2="accent2" accent3="accent3" accent4="accent4" accent5="accent5" accent6="accent6" hlink="hlink" folHlink="folHlink"/>
+  <p:hf hdr="0" ftr="0" dt="0"/>
+</p:handoutMaster>
+</file>
+
+<file path=ppt/notesMasters/notesMaster1.xml><?xml version="1.0" encoding="utf-8"?>
+<p:notesMaster xmlns:a="http://schemas.openxmlformats.org/drawingml/2006/main" xmlns:r="http://schemas.openxmlformats.org/officeDocument/2006/relationships" xmlns:p="http://schemas.openxmlformats.org/presentationml/2006/main">
+  <p:cSld>
+    <p:bg>
+      <p:bgRef idx="1001">
+        <a:schemeClr val="bg1"/>
+      </p:bgRef>
+    </p:bg>
+    <p:spTree>
+      <p:nvGrpSpPr>
+        <p:cNvPr id="1" name=""/>
+        <p:cNvGrpSpPr/>
+        <p:nvPr/>
+      </p:nvGrpSpPr>
+      <p:grpSpPr>
+        <a:xfrm>
+          <a:off x="0" y="0"/>
+          <a:ext cx="0" cy="0"/>
+          <a:chOff x="0" y="0"/>
+          <a:chExt cx="0" cy="0"/>
+        </a:xfrm>
+      </p:grpSpPr>
+      <p:sp>
+        <p:nvSpPr>
+          <p:cNvPr id="2" name="Espace réservé de l'en-tête 1"/>
+          <p:cNvSpPr>
+            <a:spLocks noGrp="1"/>
+          </p:cNvSpPr>
+          <p:nvPr>
+            <p:ph type="hdr" sz="quarter"/>
+          </p:nvPr>
+        </p:nvSpPr>
+        <p:spPr>
+          <a:xfrm>
+            <a:off x="0" y="0"/>
+            <a:ext cx="2971800" cy="458788"/>
+          </a:xfrm>
+          <a:prstGeom prst="rect">
+            <a:avLst/>
+          </a:prstGeom>
+        </p:spPr>
+        <p:txBody>
+          <a:bodyPr vert="horz" lIns="91440" tIns="45720" rIns="91440" bIns="45720" rtlCol="0"/>
+          <a:lstStyle>
+            <a:lvl1pPr algn="l">
+              <a:defRPr sz="1200"/>
+            </a:lvl1pPr>
+          </a:lstStyle>
+          <a:p>
+            <a:endParaRPr lang="fr-CH"/>
+          </a:p>
+        </p:txBody>
+      </p:sp>
+      <p:sp>
+        <p:nvSpPr>
+          <p:cNvPr id="3" name="Espace réservé de la date 2"/>
+          <p:cNvSpPr>
+            <a:spLocks noGrp="1"/>
+          </p:cNvSpPr>
+          <p:nvPr>
+            <p:ph type="dt" idx="1"/>
+          </p:nvPr>
+        </p:nvSpPr>
+        <p:spPr>
+          <a:xfrm>
+            <a:off x="3884613" y="0"/>
+            <a:ext cx="2971800" cy="458788"/>
+          </a:xfrm>
+          <a:prstGeom prst="rect">
+            <a:avLst/>
+          </a:prstGeom>
+        </p:spPr>
+        <p:txBody>
+          <a:bodyPr vert="horz" lIns="91440" tIns="45720" rIns="91440" bIns="45720" rtlCol="0"/>
+          <a:lstStyle>
+            <a:lvl1pPr algn="r">
+              <a:defRPr sz="1200"/>
+            </a:lvl1pPr>
+          </a:lstStyle>
+          <a:p>
+            <a:fld id="{6AF760C4-029F-44C2-9523-280D45F528BB}" type="datetimeFigureOut">
+              <a:rPr lang="fr-CH" smtClean="0"/>
+              <a:t>30.03.2023</a:t>
+            </a:fld>
+            <a:endParaRPr lang="fr-CH"/>
+          </a:p>
+        </p:txBody>
+      </p:sp>
+      <p:sp>
+        <p:nvSpPr>
+          <p:cNvPr id="4" name="Espace réservé de l'image des diapositives 3"/>
+          <p:cNvSpPr>
+            <a:spLocks noGrp="1" noRot="1" noChangeAspect="1"/>
+          </p:cNvSpPr>
+          <p:nvPr>
+            <p:ph type="sldImg" idx="2"/>
+          </p:nvPr>
+        </p:nvSpPr>
+        <p:spPr>
+          <a:xfrm>
+            <a:off x="685800" y="1143000"/>
+            <a:ext cx="5486400" cy="3086100"/>
+          </a:xfrm>
+          <a:prstGeom prst="rect">
+            <a:avLst/>
+          </a:prstGeom>
+          <a:noFill/>
+          <a:ln w="12700">
+            <a:solidFill>
+              <a:prstClr val="black"/>
+            </a:solidFill>
+          </a:ln>
+        </p:spPr>
+        <p:txBody>
+          <a:bodyPr vert="horz" lIns="91440" tIns="45720" rIns="91440" bIns="45720" rtlCol="0" anchor="ctr"/>
+          <a:lstStyle/>
+          <a:p>
+            <a:endParaRPr lang="fr-CH"/>
+          </a:p>
+        </p:txBody>
+      </p:sp>
+      <p:sp>
+        <p:nvSpPr>
+          <p:cNvPr id="5" name="Espace réservé des notes 4"/>
+          <p:cNvSpPr>
+            <a:spLocks noGrp="1"/>
+          </p:cNvSpPr>
+          <p:nvPr>
+            <p:ph type="body" sz="quarter" idx="3"/>
+          </p:nvPr>
+        </p:nvSpPr>
+        <p:spPr>
+          <a:xfrm>
+            <a:off x="685800" y="4400550"/>
+            <a:ext cx="5486400" cy="3600450"/>
+          </a:xfrm>
+          <a:prstGeom prst="rect">
+            <a:avLst/>
+          </a:prstGeom>
+        </p:spPr>
+        <p:txBody>
+          <a:bodyPr vert="horz" lIns="91440" tIns="45720" rIns="91440" bIns="45720" rtlCol="0"/>
+          <a:lstStyle/>
+          <a:p>
+            <a:pPr lvl="0"/>
+            <a:r>
+              <a:rPr lang="fr-FR" smtClean="0"/>
+              <a:t>Modifier les styles du texte du masque</a:t>
+            </a:r>
+          </a:p>
+          <a:p>
+            <a:pPr lvl="1"/>
+            <a:r>
+              <a:rPr lang="fr-FR" smtClean="0"/>
+              <a:t>Deuxième niveau</a:t>
+            </a:r>
+          </a:p>
+          <a:p>
+            <a:pPr lvl="2"/>
+            <a:r>
+              <a:rPr lang="fr-FR" smtClean="0"/>
+              <a:t>Troisième niveau</a:t>
+            </a:r>
+          </a:p>
+          <a:p>
+            <a:pPr lvl="3"/>
+            <a:r>
+              <a:rPr lang="fr-FR" smtClean="0"/>
+              <a:t>Quatrième niveau</a:t>
+            </a:r>
+          </a:p>
+          <a:p>
+            <a:pPr lvl="4"/>
+            <a:r>
+              <a:rPr lang="fr-FR" smtClean="0"/>
+              <a:t>Cinquième niveau</a:t>
+            </a:r>
+            <a:endParaRPr lang="fr-CH"/>
+          </a:p>
+        </p:txBody>
+      </p:sp>
+      <p:sp>
+        <p:nvSpPr>
+          <p:cNvPr id="6" name="Espace réservé du pied de page 5"/>
+          <p:cNvSpPr>
+            <a:spLocks noGrp="1"/>
+          </p:cNvSpPr>
+          <p:nvPr>
+            <p:ph type="ftr" sz="quarter" idx="4"/>
+          </p:nvPr>
+        </p:nvSpPr>
+        <p:spPr>
+          <a:xfrm>
+            <a:off x="0" y="8685213"/>
+            <a:ext cx="2971800" cy="458787"/>
+          </a:xfrm>
+          <a:prstGeom prst="rect">
+            <a:avLst/>
+          </a:prstGeom>
+        </p:spPr>
+        <p:txBody>
+          <a:bodyPr vert="horz" lIns="91440" tIns="45720" rIns="91440" bIns="45720" rtlCol="0" anchor="b"/>
+          <a:lstStyle>
+            <a:lvl1pPr algn="l">
+              <a:defRPr sz="1200"/>
+            </a:lvl1pPr>
+          </a:lstStyle>
+          <a:p>
+            <a:endParaRPr lang="fr-CH"/>
+          </a:p>
+        </p:txBody>
+      </p:sp>
+      <p:sp>
+        <p:nvSpPr>
+          <p:cNvPr id="7" name="Espace réservé du numéro de diapositive 6"/>
+          <p:cNvSpPr>
+            <a:spLocks noGrp="1"/>
+          </p:cNvSpPr>
+          <p:nvPr>
+            <p:ph type="sldNum" sz="quarter" idx="5"/>
+          </p:nvPr>
+        </p:nvSpPr>
+        <p:spPr>
+          <a:xfrm>
+            <a:off x="3884613" y="8685213"/>
+            <a:ext cx="2971800" cy="458787"/>
+          </a:xfrm>
+          <a:prstGeom prst="rect">
+            <a:avLst/>
+          </a:prstGeom>
+        </p:spPr>
+        <p:txBody>
+          <a:bodyPr vert="horz" lIns="91440" tIns="45720" rIns="91440" bIns="45720" rtlCol="0" anchor="b"/>
+          <a:lstStyle>
+            <a:lvl1pPr algn="r">
+              <a:defRPr sz="1200"/>
+            </a:lvl1pPr>
+          </a:lstStyle>
+          <a:p>
+            <a:fld id="{C55A4533-AF4E-420E-82A7-9D7911AD861F}" type="slidenum">
+              <a:rPr lang="fr-CH" smtClean="0"/>
+              <a:t>‹N°›</a:t>
+            </a:fld>
+            <a:endParaRPr lang="fr-CH"/>
+          </a:p>
+        </p:txBody>
+      </p:sp>
+    </p:spTree>
+    <p:extLst>
+      <p:ext uri="{BB962C8B-B14F-4D97-AF65-F5344CB8AC3E}">
+        <p14:creationId xmlns:p14="http://schemas.microsoft.com/office/powerpoint/2010/main" val="1612193799"/>
+      </p:ext>
+    </p:extLst>
+  </p:cSld>
+  <p:clrMap bg1="lt1" tx1="dk1" bg2="lt2" tx2="dk2" accent1="accent1" accent2="accent2" accent3="accent3" accent4="accent4" accent5="accent5" accent6="accent6" hlink="hlink" folHlink="folHlink"/>
+  <p:hf hdr="0" ftr="0" dt="0"/>
+  <p:notesStyle>
+    <a:lvl1pPr marL="0" algn="l" defTabSz="914400" rtl="0" eaLnBrk="1" latinLnBrk="0" hangingPunct="1">
+      <a:defRPr sz="1200" kern="1200">
+        <a:solidFill>
+          <a:schemeClr val="tx1"/>
+        </a:solidFill>
+        <a:latin typeface="+mn-lt"/>
+        <a:ea typeface="+mn-ea"/>
+        <a:cs typeface="+mn-cs"/>
+      </a:defRPr>
+    </a:lvl1pPr>
+    <a:lvl2pPr marL="457200" algn="l" defTabSz="914400" rtl="0" eaLnBrk="1" latinLnBrk="0" hangingPunct="1">
+      <a:defRPr sz="1200" kern="1200">
+        <a:solidFill>
+          <a:schemeClr val="tx1"/>
+        </a:solidFill>
+        <a:latin typeface="+mn-lt"/>
+        <a:ea typeface="+mn-ea"/>
+        <a:cs typeface="+mn-cs"/>
+      </a:defRPr>
+    </a:lvl2pPr>
+    <a:lvl3pPr marL="914400" algn="l" defTabSz="914400" rtl="0" eaLnBrk="1" latinLnBrk="0" hangingPunct="1">
+      <a:defRPr sz="1200" kern="1200">
+        <a:solidFill>
+          <a:schemeClr val="tx1"/>
+        </a:solidFill>
+        <a:latin typeface="+mn-lt"/>
+        <a:ea typeface="+mn-ea"/>
+        <a:cs typeface="+mn-cs"/>
+      </a:defRPr>
+    </a:lvl3pPr>
+    <a:lvl4pPr marL="1371600" algn="l" defTabSz="914400" rtl="0" eaLnBrk="1" latinLnBrk="0" hangingPunct="1">
+      <a:defRPr sz="1200" kern="1200">
+        <a:solidFill>
+          <a:schemeClr val="tx1"/>
+        </a:solidFill>
+        <a:latin typeface="+mn-lt"/>
+        <a:ea typeface="+mn-ea"/>
+        <a:cs typeface="+mn-cs"/>
+      </a:defRPr>
+    </a:lvl4pPr>
+    <a:lvl5pPr marL="1828800" algn="l" defTabSz="914400" rtl="0" eaLnBrk="1" latinLnBrk="0" hangingPunct="1">
+      <a:defRPr sz="1200" kern="1200">
+        <a:solidFill>
+          <a:schemeClr val="tx1"/>
+        </a:solidFill>
+        <a:latin typeface="+mn-lt"/>
+        <a:ea typeface="+mn-ea"/>
+        <a:cs typeface="+mn-cs"/>
+      </a:defRPr>
+    </a:lvl5pPr>
+    <a:lvl6pPr marL="2286000" algn="l" defTabSz="914400" rtl="0" eaLnBrk="1" latinLnBrk="0" hangingPunct="1">
+      <a:defRPr sz="1200" kern="1200">
+        <a:solidFill>
+          <a:schemeClr val="tx1"/>
+        </a:solidFill>
+        <a:latin typeface="+mn-lt"/>
+        <a:ea typeface="+mn-ea"/>
+        <a:cs typeface="+mn-cs"/>
+      </a:defRPr>
+    </a:lvl6pPr>
+    <a:lvl7pPr marL="2743200" algn="l" defTabSz="914400" rtl="0" eaLnBrk="1" latinLnBrk="0" hangingPunct="1">
+      <a:defRPr sz="1200" kern="1200">
+        <a:solidFill>
+          <a:schemeClr val="tx1"/>
+        </a:solidFill>
+        <a:latin typeface="+mn-lt"/>
+        <a:ea typeface="+mn-ea"/>
+        <a:cs typeface="+mn-cs"/>
+      </a:defRPr>
+    </a:lvl7pPr>
+    <a:lvl8pPr marL="3200400" algn="l" defTabSz="914400" rtl="0" eaLnBrk="1" latinLnBrk="0" hangingPunct="1">
+      <a:defRPr sz="1200" kern="1200">
+        <a:solidFill>
+          <a:schemeClr val="tx1"/>
+        </a:solidFill>
+        <a:latin typeface="+mn-lt"/>
+        <a:ea typeface="+mn-ea"/>
+        <a:cs typeface="+mn-cs"/>
+      </a:defRPr>
+    </a:lvl8pPr>
+    <a:lvl9pPr marL="3657600" algn="l" defTabSz="914400" rtl="0" eaLnBrk="1" latinLnBrk="0" hangingPunct="1">
+      <a:defRPr sz="1200" kern="1200">
+        <a:solidFill>
+          <a:schemeClr val="tx1"/>
+        </a:solidFill>
+        <a:latin typeface="+mn-lt"/>
+        <a:ea typeface="+mn-ea"/>
+        <a:cs typeface="+mn-cs"/>
+      </a:defRPr>
+    </a:lvl9pPr>
+  </p:notesStyle>
+</p:notesMaster>
 </file>
 
 <file path=ppt/slideLayouts/slideLayout1.xml><?xml version="1.0" encoding="utf-8"?>
@@ -840,9 +1372,9 @@
           <a:bodyPr/>
           <a:lstStyle/>
           <a:p>
-            <a:fld id="{C60FADEA-0F04-4715-BCEB-C866D4F1CCFA}" type="datetimeFigureOut">
+            <a:fld id="{4BF9F6F7-529A-4DAE-AA64-23C354954B4A}" type="datetime1">
               <a:rPr lang="fr-CH" smtClean="0"/>
-              <a:t>29.03.2023</a:t>
+              <a:t>30.03.2023</a:t>
             </a:fld>
             <a:endParaRPr lang="fr-CH"/>
           </a:p>
@@ -863,6 +1395,10 @@
           <a:bodyPr/>
           <a:lstStyle/>
           <a:p>
+            <a:r>
+              <a:rPr lang="fr-CH" smtClean="0"/>
+              <a:t>Thierry Koetschet SI-CA2a</a:t>
+            </a:r>
             <a:endParaRPr lang="fr-CH"/>
           </a:p>
         </p:txBody>
@@ -1091,9 +1627,9 @@
           <a:bodyPr/>
           <a:lstStyle/>
           <a:p>
-            <a:fld id="{C60FADEA-0F04-4715-BCEB-C866D4F1CCFA}" type="datetimeFigureOut">
+            <a:fld id="{CB47B5A0-8909-493D-8F1D-739A2DB5FC01}" type="datetime1">
               <a:rPr lang="fr-CH" smtClean="0"/>
-              <a:t>29.03.2023</a:t>
+              <a:t>30.03.2023</a:t>
             </a:fld>
             <a:endParaRPr lang="fr-CH"/>
           </a:p>
@@ -1114,6 +1650,10 @@
           <a:bodyPr/>
           <a:lstStyle/>
           <a:p>
+            <a:r>
+              <a:rPr lang="fr-CH" smtClean="0"/>
+              <a:t>Thierry Koetschet SI-CA2a</a:t>
+            </a:r>
             <a:endParaRPr lang="fr-CH"/>
           </a:p>
         </p:txBody>
@@ -1405,9 +1945,9 @@
           <a:bodyPr/>
           <a:lstStyle/>
           <a:p>
-            <a:fld id="{C60FADEA-0F04-4715-BCEB-C866D4F1CCFA}" type="datetimeFigureOut">
+            <a:fld id="{DA28902D-86C6-44A7-9E96-E1317055E095}" type="datetime1">
               <a:rPr lang="fr-CH" smtClean="0"/>
-              <a:t>29.03.2023</a:t>
+              <a:t>30.03.2023</a:t>
             </a:fld>
             <a:endParaRPr lang="fr-CH"/>
           </a:p>
@@ -1428,6 +1968,10 @@
           <a:bodyPr/>
           <a:lstStyle/>
           <a:p>
+            <a:r>
+              <a:rPr lang="fr-CH" smtClean="0"/>
+              <a:t>Thierry Koetschet SI-CA2a</a:t>
+            </a:r>
             <a:endParaRPr lang="fr-CH"/>
           </a:p>
         </p:txBody>
@@ -1746,9 +2290,9 @@
           <a:bodyPr/>
           <a:lstStyle/>
           <a:p>
-            <a:fld id="{C60FADEA-0F04-4715-BCEB-C866D4F1CCFA}" type="datetimeFigureOut">
+            <a:fld id="{8CC3B1E6-8890-440A-AC37-FF2238629CF9}" type="datetime1">
               <a:rPr lang="fr-CH" smtClean="0"/>
-              <a:t>29.03.2023</a:t>
+              <a:t>30.03.2023</a:t>
             </a:fld>
             <a:endParaRPr lang="fr-CH"/>
           </a:p>
@@ -1769,6 +2313,10 @@
           <a:bodyPr/>
           <a:lstStyle/>
           <a:p>
+            <a:r>
+              <a:rPr lang="fr-CH" smtClean="0"/>
+              <a:t>Thierry Koetschet SI-CA2a</a:t>
+            </a:r>
             <a:endParaRPr lang="fr-CH"/>
           </a:p>
         </p:txBody>
@@ -2060,9 +2608,9 @@
           <a:bodyPr/>
           <a:lstStyle/>
           <a:p>
-            <a:fld id="{C60FADEA-0F04-4715-BCEB-C866D4F1CCFA}" type="datetimeFigureOut">
+            <a:fld id="{26A2EF5D-B982-4191-AE24-A5C27BB4E3D3}" type="datetime1">
               <a:rPr lang="fr-CH" smtClean="0"/>
-              <a:t>29.03.2023</a:t>
+              <a:t>30.03.2023</a:t>
             </a:fld>
             <a:endParaRPr lang="fr-CH"/>
           </a:p>
@@ -2083,6 +2631,10 @@
           <a:bodyPr/>
           <a:lstStyle/>
           <a:p>
+            <a:r>
+              <a:rPr lang="fr-CH" smtClean="0"/>
+              <a:t>Thierry Koetschet SI-CA2a</a:t>
+            </a:r>
             <a:endParaRPr lang="fr-CH"/>
           </a:p>
         </p:txBody>
@@ -2453,9 +3005,9 @@
           <a:bodyPr/>
           <a:lstStyle/>
           <a:p>
-            <a:fld id="{C60FADEA-0F04-4715-BCEB-C866D4F1CCFA}" type="datetimeFigureOut">
+            <a:fld id="{1FF0F0BF-C050-4671-87EA-183EF555C754}" type="datetime1">
               <a:rPr lang="fr-CH" smtClean="0"/>
-              <a:t>29.03.2023</a:t>
+              <a:t>30.03.2023</a:t>
             </a:fld>
             <a:endParaRPr lang="fr-CH"/>
           </a:p>
@@ -2476,6 +3028,10 @@
           <a:bodyPr/>
           <a:lstStyle/>
           <a:p>
+            <a:r>
+              <a:rPr lang="fr-CH" smtClean="0"/>
+              <a:t>Thierry Koetschet SI-CA2a</a:t>
+            </a:r>
             <a:endParaRPr lang="fr-CH"/>
           </a:p>
         </p:txBody>
@@ -2623,9 +3179,9 @@
           <a:bodyPr/>
           <a:lstStyle/>
           <a:p>
-            <a:fld id="{C60FADEA-0F04-4715-BCEB-C866D4F1CCFA}" type="datetimeFigureOut">
+            <a:fld id="{529C5780-F88A-4585-B174-EEE4F0BD3DC2}" type="datetime1">
               <a:rPr lang="fr-CH" smtClean="0"/>
-              <a:t>29.03.2023</a:t>
+              <a:t>30.03.2023</a:t>
             </a:fld>
             <a:endParaRPr lang="fr-CH"/>
           </a:p>
@@ -2646,6 +3202,10 @@
           <a:bodyPr/>
           <a:lstStyle/>
           <a:p>
+            <a:r>
+              <a:rPr lang="fr-CH" smtClean="0"/>
+              <a:t>Thierry Koetschet SI-CA2a</a:t>
+            </a:r>
             <a:endParaRPr lang="fr-CH"/>
           </a:p>
         </p:txBody>
@@ -2803,9 +3363,9 @@
           <a:bodyPr/>
           <a:lstStyle/>
           <a:p>
-            <a:fld id="{C60FADEA-0F04-4715-BCEB-C866D4F1CCFA}" type="datetimeFigureOut">
+            <a:fld id="{506C9110-4A4A-4F34-AFF5-8E2F2ECE9614}" type="datetime1">
               <a:rPr lang="fr-CH" smtClean="0"/>
-              <a:t>29.03.2023</a:t>
+              <a:t>30.03.2023</a:t>
             </a:fld>
             <a:endParaRPr lang="fr-CH"/>
           </a:p>
@@ -2826,6 +3386,10 @@
           <a:bodyPr/>
           <a:lstStyle/>
           <a:p>
+            <a:r>
+              <a:rPr lang="fr-CH" smtClean="0"/>
+              <a:t>Thierry Koetschet SI-CA2a</a:t>
+            </a:r>
             <a:endParaRPr lang="fr-CH"/>
           </a:p>
         </p:txBody>
@@ -2979,9 +3543,9 @@
           <a:bodyPr/>
           <a:lstStyle/>
           <a:p>
-            <a:fld id="{C60FADEA-0F04-4715-BCEB-C866D4F1CCFA}" type="datetimeFigureOut">
+            <a:fld id="{08AFFB39-D5D2-4EB0-ACB2-1519C30E6A68}" type="datetime1">
               <a:rPr lang="fr-CH" smtClean="0"/>
-              <a:t>29.03.2023</a:t>
+              <a:t>30.03.2023</a:t>
             </a:fld>
             <a:endParaRPr lang="fr-CH"/>
           </a:p>
@@ -3002,6 +3566,10 @@
           <a:bodyPr/>
           <a:lstStyle/>
           <a:p>
+            <a:r>
+              <a:rPr lang="fr-CH" smtClean="0"/>
+              <a:t>Thierry Koetschet SI-CA2a</a:t>
+            </a:r>
             <a:endParaRPr lang="fr-CH"/>
           </a:p>
         </p:txBody>
@@ -3226,9 +3794,9 @@
           <a:bodyPr/>
           <a:lstStyle/>
           <a:p>
-            <a:fld id="{C60FADEA-0F04-4715-BCEB-C866D4F1CCFA}" type="datetimeFigureOut">
+            <a:fld id="{73160872-60DA-4E02-935D-D59DC04DE539}" type="datetime1">
               <a:rPr lang="fr-CH" smtClean="0"/>
-              <a:t>29.03.2023</a:t>
+              <a:t>30.03.2023</a:t>
             </a:fld>
             <a:endParaRPr lang="fr-CH"/>
           </a:p>
@@ -3249,6 +3817,10 @@
           <a:bodyPr/>
           <a:lstStyle/>
           <a:p>
+            <a:r>
+              <a:rPr lang="fr-CH" smtClean="0"/>
+              <a:t>Thierry Koetschet SI-CA2a</a:t>
+            </a:r>
             <a:endParaRPr lang="fr-CH"/>
           </a:p>
         </p:txBody>
@@ -3458,9 +4030,9 @@
           <a:bodyPr/>
           <a:lstStyle/>
           <a:p>
-            <a:fld id="{C60FADEA-0F04-4715-BCEB-C866D4F1CCFA}" type="datetimeFigureOut">
+            <a:fld id="{EE74F7EC-EBE2-43C3-8940-D8609ED794BB}" type="datetime1">
               <a:rPr lang="fr-CH" smtClean="0"/>
-              <a:t>29.03.2023</a:t>
+              <a:t>30.03.2023</a:t>
             </a:fld>
             <a:endParaRPr lang="fr-CH"/>
           </a:p>
@@ -3481,6 +4053,10 @@
           <a:bodyPr/>
           <a:lstStyle/>
           <a:p>
+            <a:r>
+              <a:rPr lang="fr-CH" smtClean="0"/>
+              <a:t>Thierry Koetschet SI-CA2a</a:t>
+            </a:r>
             <a:endParaRPr lang="fr-CH"/>
           </a:p>
         </p:txBody>
@@ -3832,9 +4408,9 @@
           <a:bodyPr/>
           <a:lstStyle/>
           <a:p>
-            <a:fld id="{C60FADEA-0F04-4715-BCEB-C866D4F1CCFA}" type="datetimeFigureOut">
+            <a:fld id="{90592469-FAD5-406F-919E-0C783BC9982E}" type="datetime1">
               <a:rPr lang="fr-CH" smtClean="0"/>
-              <a:t>29.03.2023</a:t>
+              <a:t>30.03.2023</a:t>
             </a:fld>
             <a:endParaRPr lang="fr-CH"/>
           </a:p>
@@ -3855,6 +4431,10 @@
           <a:bodyPr/>
           <a:lstStyle/>
           <a:p>
+            <a:r>
+              <a:rPr lang="fr-CH" smtClean="0"/>
+              <a:t>Thierry Koetschet SI-CA2a</a:t>
+            </a:r>
             <a:endParaRPr lang="fr-CH"/>
           </a:p>
         </p:txBody>
@@ -3955,9 +4535,9 @@
           <a:bodyPr/>
           <a:lstStyle/>
           <a:p>
-            <a:fld id="{C60FADEA-0F04-4715-BCEB-C866D4F1CCFA}" type="datetimeFigureOut">
+            <a:fld id="{128596FC-9A9D-4D55-82EE-825CA4E73FAB}" type="datetime1">
               <a:rPr lang="fr-CH" smtClean="0"/>
-              <a:t>29.03.2023</a:t>
+              <a:t>30.03.2023</a:t>
             </a:fld>
             <a:endParaRPr lang="fr-CH"/>
           </a:p>
@@ -3978,6 +4558,10 @@
           <a:bodyPr/>
           <a:lstStyle/>
           <a:p>
+            <a:r>
+              <a:rPr lang="fr-CH" smtClean="0"/>
+              <a:t>Thierry Koetschet SI-CA2a</a:t>
+            </a:r>
             <a:endParaRPr lang="fr-CH"/>
           </a:p>
         </p:txBody>
@@ -4050,9 +4634,9 @@
           <a:bodyPr/>
           <a:lstStyle/>
           <a:p>
-            <a:fld id="{C60FADEA-0F04-4715-BCEB-C866D4F1CCFA}" type="datetimeFigureOut">
+            <a:fld id="{F8E35A72-B85C-47CD-BBC3-693D5E638661}" type="datetime1">
               <a:rPr lang="fr-CH" smtClean="0"/>
-              <a:t>29.03.2023</a:t>
+              <a:t>30.03.2023</a:t>
             </a:fld>
             <a:endParaRPr lang="fr-CH"/>
           </a:p>
@@ -4073,6 +4657,10 @@
           <a:bodyPr/>
           <a:lstStyle/>
           <a:p>
+            <a:r>
+              <a:rPr lang="fr-CH" smtClean="0"/>
+              <a:t>Thierry Koetschet SI-CA2a</a:t>
+            </a:r>
             <a:endParaRPr lang="fr-CH"/>
           </a:p>
         </p:txBody>
@@ -4305,9 +4893,9 @@
           <a:bodyPr/>
           <a:lstStyle/>
           <a:p>
-            <a:fld id="{C60FADEA-0F04-4715-BCEB-C866D4F1CCFA}" type="datetimeFigureOut">
+            <a:fld id="{2EDDA93E-5E98-40A5-B3C7-F6E7779882E1}" type="datetime1">
               <a:rPr lang="fr-CH" smtClean="0"/>
-              <a:t>29.03.2023</a:t>
+              <a:t>30.03.2023</a:t>
             </a:fld>
             <a:endParaRPr lang="fr-CH"/>
           </a:p>
@@ -4328,6 +4916,10 @@
           <a:bodyPr/>
           <a:lstStyle/>
           <a:p>
+            <a:r>
+              <a:rPr lang="fr-CH" smtClean="0"/>
+              <a:t>Thierry Koetschet SI-CA2a</a:t>
+            </a:r>
             <a:endParaRPr lang="fr-CH"/>
           </a:p>
         </p:txBody>
@@ -4568,9 +5160,9 @@
           <a:bodyPr/>
           <a:lstStyle/>
           <a:p>
-            <a:fld id="{C60FADEA-0F04-4715-BCEB-C866D4F1CCFA}" type="datetimeFigureOut">
+            <a:fld id="{9BD0A1EA-6F91-4C4E-A51E-8133AFFED5EC}" type="datetime1">
               <a:rPr lang="fr-CH" smtClean="0"/>
-              <a:t>29.03.2023</a:t>
+              <a:t>30.03.2023</a:t>
             </a:fld>
             <a:endParaRPr lang="fr-CH"/>
           </a:p>
@@ -4591,6 +5183,10 @@
           <a:bodyPr/>
           <a:lstStyle/>
           <a:p>
+            <a:r>
+              <a:rPr lang="fr-CH" smtClean="0"/>
+              <a:t>Thierry Koetschet SI-CA2a</a:t>
+            </a:r>
             <a:endParaRPr lang="fr-CH"/>
           </a:p>
         </p:txBody>
@@ -5311,9 +5907,9 @@
             </a:lvl1pPr>
           </a:lstStyle>
           <a:p>
-            <a:fld id="{C60FADEA-0F04-4715-BCEB-C866D4F1CCFA}" type="datetimeFigureOut">
+            <a:fld id="{44A3B628-FA37-4DB5-890C-DC025D5A5FEF}" type="datetime1">
               <a:rPr lang="fr-CH" smtClean="0"/>
-              <a:t>29.03.2023</a:t>
+              <a:t>30.03.2023</a:t>
             </a:fld>
             <a:endParaRPr lang="fr-CH"/>
           </a:p>
@@ -5352,6 +5948,10 @@
             </a:lvl1pPr>
           </a:lstStyle>
           <a:p>
+            <a:r>
+              <a:rPr lang="fr-CH" smtClean="0"/>
+              <a:t>Thierry Koetschet SI-CA2a</a:t>
+            </a:r>
             <a:endParaRPr lang="fr-CH"/>
           </a:p>
         </p:txBody>
@@ -5421,6 +6021,7 @@
     <p:sldLayoutId id="2147483675" r:id="rId15"/>
     <p:sldLayoutId id="2147483676" r:id="rId16"/>
   </p:sldLayoutIdLst>
+  <p:hf hdr="0" dt="0"/>
   <p:txStyles>
     <p:titleStyle>
       <a:lvl1pPr algn="l" defTabSz="457200" rtl="0" eaLnBrk="1" latinLnBrk="0" hangingPunct="1">
@@ -5981,6 +6582,13 @@
   <p:clrMapOvr>
     <a:masterClrMapping/>
   </p:clrMapOvr>
+  <p:timing>
+    <p:tnLst>
+      <p:par>
+        <p:cTn id="1" dur="indefinite" restart="never" nodeType="tmRoot"/>
+      </p:par>
+    </p:tnLst>
+  </p:timing>
 </p:sld>
 </file>
 
@@ -6018,7 +6626,7 @@
           <a:p>
             <a:r>
               <a:rPr lang="fr-CH" dirty="0" smtClean="0"/>
-              <a:t>Conception</a:t>
+              <a:t>Analyse</a:t>
             </a:r>
             <a:endParaRPr lang="fr-CH" dirty="0"/>
           </a:p>
@@ -6026,27 +6634,111 @@
       </p:sp>
       <p:sp>
         <p:nvSpPr>
-          <p:cNvPr id="3" name="Espace réservé du contenu 2"/>
-          <p:cNvSpPr>
-            <a:spLocks noGrp="1"/>
-          </p:cNvSpPr>
+          <p:cNvPr id="5" name="Espace réservé du pied de page 4"/>
+          <p:cNvSpPr>
+            <a:spLocks noGrp="1"/>
+          </p:cNvSpPr>
+          <p:nvPr>
+            <p:ph type="ftr" sz="quarter" idx="11"/>
+          </p:nvPr>
+        </p:nvSpPr>
+        <p:spPr/>
+        <p:txBody>
+          <a:bodyPr/>
+          <a:lstStyle/>
+          <a:p>
+            <a:r>
+              <a:rPr lang="fr-CH" dirty="0" smtClean="0"/>
+              <a:t>Thierry </a:t>
+            </a:r>
+            <a:r>
+              <a:rPr lang="fr-CH" dirty="0" err="1" smtClean="0"/>
+              <a:t>Koetschet</a:t>
+            </a:r>
+            <a:r>
+              <a:rPr lang="fr-CH" dirty="0" smtClean="0"/>
+              <a:t> </a:t>
+            </a:r>
+          </a:p>
+          <a:p>
+            <a:r>
+              <a:rPr lang="fr-CH" dirty="0" smtClean="0"/>
+              <a:t>SI-CA2a</a:t>
+            </a:r>
+            <a:endParaRPr lang="fr-CH" dirty="0"/>
+          </a:p>
+        </p:txBody>
+      </p:sp>
+      <p:sp>
+        <p:nvSpPr>
+          <p:cNvPr id="6" name="Espace réservé du numéro de diapositive 5"/>
+          <p:cNvSpPr>
+            <a:spLocks noGrp="1"/>
+          </p:cNvSpPr>
+          <p:nvPr>
+            <p:ph type="sldNum" sz="quarter" idx="12"/>
+          </p:nvPr>
+        </p:nvSpPr>
+        <p:spPr/>
+        <p:txBody>
+          <a:bodyPr/>
+          <a:lstStyle/>
+          <a:p>
+            <a:fld id="{5ECE0F15-BD04-4B70-8AC1-6501C07CDE78}" type="slidenum">
+              <a:rPr lang="fr-CH" smtClean="0"/>
+              <a:t>10</a:t>
+            </a:fld>
+            <a:endParaRPr lang="fr-CH"/>
+          </a:p>
+        </p:txBody>
+      </p:sp>
+      <p:pic>
+        <p:nvPicPr>
+          <p:cNvPr id="2050" name="Picture 2" descr="You too, embrace cross-platform development with React Native"/>
+          <p:cNvPicPr>
+            <a:picLocks noGrp="1" noChangeAspect="1" noChangeArrowheads="1"/>
+          </p:cNvPicPr>
           <p:nvPr>
             <p:ph idx="1"/>
           </p:nvPr>
-        </p:nvSpPr>
-        <p:spPr/>
-        <p:txBody>
-          <a:bodyPr/>
-          <a:lstStyle/>
-          <a:p>
-            <a:endParaRPr lang="fr-CH"/>
-          </a:p>
-        </p:txBody>
-      </p:sp>
+        </p:nvPicPr>
+        <p:blipFill>
+          <a:blip r:embed="rId2">
+            <a:extLst>
+              <a:ext uri="{28A0092B-C50C-407E-A947-70E740481C1C}">
+                <a14:useLocalDpi xmlns:a14="http://schemas.microsoft.com/office/drawing/2010/main" val="0"/>
+              </a:ext>
+            </a:extLst>
+          </a:blip>
+          <a:srcRect/>
+          <a:stretch>
+            <a:fillRect/>
+          </a:stretch>
+        </p:blipFill>
+        <p:spPr bwMode="auto">
+          <a:xfrm>
+            <a:off x="1929539" y="1796717"/>
+            <a:ext cx="6092258" cy="4003150"/>
+          </a:xfrm>
+          <a:prstGeom prst="rect">
+            <a:avLst/>
+          </a:prstGeom>
+          <a:noFill/>
+          <a:extLst>
+            <a:ext uri="{909E8E84-426E-40DD-AFC4-6F175D3DCCD1}">
+              <a14:hiddenFill xmlns:a14="http://schemas.microsoft.com/office/drawing/2010/main">
+                <a:solidFill>
+                  <a:srgbClr val="FFFFFF"/>
+                </a:solidFill>
+              </a14:hiddenFill>
+            </a:ext>
+          </a:extLst>
+        </p:spPr>
+      </p:pic>
     </p:spTree>
     <p:extLst>
       <p:ext uri="{BB962C8B-B14F-4D97-AF65-F5344CB8AC3E}">
-        <p14:creationId xmlns:p14="http://schemas.microsoft.com/office/powerpoint/2010/main" val="857158550"/>
+        <p14:creationId xmlns:p14="http://schemas.microsoft.com/office/powerpoint/2010/main" val="1045582309"/>
       </p:ext>
     </p:extLst>
   </p:cSld>
@@ -6097,7 +6789,7 @@
           <a:p>
             <a:r>
               <a:rPr lang="fr-CH" dirty="0" smtClean="0"/>
-              <a:t>Réalisation</a:t>
+              <a:t>Analyse</a:t>
             </a:r>
             <a:endParaRPr lang="fr-CH" dirty="0"/>
           </a:p>
@@ -6105,33 +6797,124 @@
       </p:sp>
       <p:sp>
         <p:nvSpPr>
-          <p:cNvPr id="3" name="Espace réservé du contenu 2"/>
-          <p:cNvSpPr>
-            <a:spLocks noGrp="1"/>
-          </p:cNvSpPr>
+          <p:cNvPr id="5" name="Espace réservé du pied de page 4"/>
+          <p:cNvSpPr>
+            <a:spLocks noGrp="1"/>
+          </p:cNvSpPr>
+          <p:nvPr>
+            <p:ph type="ftr" sz="quarter" idx="11"/>
+          </p:nvPr>
+        </p:nvSpPr>
+        <p:spPr/>
+        <p:txBody>
+          <a:bodyPr/>
+          <a:lstStyle/>
+          <a:p>
+            <a:r>
+              <a:rPr lang="fr-CH" dirty="0" smtClean="0"/>
+              <a:t>Thierry </a:t>
+            </a:r>
+            <a:r>
+              <a:rPr lang="fr-CH" dirty="0" err="1" smtClean="0"/>
+              <a:t>Koetschet</a:t>
+            </a:r>
+            <a:r>
+              <a:rPr lang="fr-CH" dirty="0" smtClean="0"/>
+              <a:t> </a:t>
+            </a:r>
+          </a:p>
+          <a:p>
+            <a:r>
+              <a:rPr lang="fr-CH" dirty="0" smtClean="0"/>
+              <a:t>SI-CA2a</a:t>
+            </a:r>
+            <a:endParaRPr lang="fr-CH" dirty="0"/>
+          </a:p>
+        </p:txBody>
+      </p:sp>
+      <p:sp>
+        <p:nvSpPr>
+          <p:cNvPr id="6" name="Espace réservé du numéro de diapositive 5"/>
+          <p:cNvSpPr>
+            <a:spLocks noGrp="1"/>
+          </p:cNvSpPr>
+          <p:nvPr>
+            <p:ph type="sldNum" sz="quarter" idx="12"/>
+          </p:nvPr>
+        </p:nvSpPr>
+        <p:spPr/>
+        <p:txBody>
+          <a:bodyPr/>
+          <a:lstStyle/>
+          <a:p>
+            <a:fld id="{5ECE0F15-BD04-4B70-8AC1-6501C07CDE78}" type="slidenum">
+              <a:rPr lang="fr-CH" smtClean="0"/>
+              <a:t>11</a:t>
+            </a:fld>
+            <a:endParaRPr lang="fr-CH"/>
+          </a:p>
+        </p:txBody>
+      </p:sp>
+      <p:pic>
+        <p:nvPicPr>
+          <p:cNvPr id="3074" name="Picture 2" descr="Flutter - Build apps for any screen"/>
+          <p:cNvPicPr>
+            <a:picLocks noGrp="1" noChangeAspect="1" noChangeArrowheads="1"/>
+          </p:cNvPicPr>
           <p:nvPr>
             <p:ph idx="1"/>
           </p:nvPr>
-        </p:nvSpPr>
-        <p:spPr/>
-        <p:txBody>
-          <a:bodyPr/>
-          <a:lstStyle/>
-          <a:p>
-            <a:endParaRPr lang="fr-CH"/>
-          </a:p>
-        </p:txBody>
-      </p:sp>
+        </p:nvPicPr>
+        <p:blipFill>
+          <a:blip r:embed="rId2">
+            <a:extLst>
+              <a:ext uri="{28A0092B-C50C-407E-A947-70E740481C1C}">
+                <a14:useLocalDpi xmlns:a14="http://schemas.microsoft.com/office/drawing/2010/main" val="0"/>
+              </a:ext>
+            </a:extLst>
+          </a:blip>
+          <a:srcRect/>
+          <a:stretch>
+            <a:fillRect/>
+          </a:stretch>
+        </p:blipFill>
+        <p:spPr bwMode="auto">
+          <a:xfrm>
+            <a:off x="1031084" y="1599114"/>
+            <a:ext cx="7889168" cy="3881437"/>
+          </a:xfrm>
+          <a:prstGeom prst="rect">
+            <a:avLst/>
+          </a:prstGeom>
+          <a:noFill/>
+          <a:extLst>
+            <a:ext uri="{909E8E84-426E-40DD-AFC4-6F175D3DCCD1}">
+              <a14:hiddenFill xmlns:a14="http://schemas.microsoft.com/office/drawing/2010/main">
+                <a:solidFill>
+                  <a:srgbClr val="FFFFFF"/>
+                </a:solidFill>
+              </a14:hiddenFill>
+            </a:ext>
+          </a:extLst>
+        </p:spPr>
+      </p:pic>
     </p:spTree>
     <p:extLst>
       <p:ext uri="{BB962C8B-B14F-4D97-AF65-F5344CB8AC3E}">
-        <p14:creationId xmlns:p14="http://schemas.microsoft.com/office/powerpoint/2010/main" val="1790757678"/>
+        <p14:creationId xmlns:p14="http://schemas.microsoft.com/office/powerpoint/2010/main" val="4007731699"/>
       </p:ext>
     </p:extLst>
   </p:cSld>
   <p:clrMapOvr>
     <a:masterClrMapping/>
   </p:clrMapOvr>
+  <p:timing>
+    <p:tnLst>
+      <p:par>
+        <p:cTn id="1" dur="indefinite" restart="never" nodeType="tmRoot"/>
+      </p:par>
+    </p:tnLst>
+  </p:timing>
 </p:sld>
 </file>
 
@@ -6169,7 +6952,7 @@
           <a:p>
             <a:r>
               <a:rPr lang="fr-CH" dirty="0" smtClean="0"/>
-              <a:t>Démonstration de l’application</a:t>
+              <a:t>Analyse</a:t>
             </a:r>
             <a:endParaRPr lang="fr-CH" dirty="0"/>
           </a:p>
@@ -6177,33 +6960,124 @@
       </p:sp>
       <p:sp>
         <p:nvSpPr>
-          <p:cNvPr id="3" name="Espace réservé du contenu 2"/>
-          <p:cNvSpPr>
-            <a:spLocks noGrp="1"/>
-          </p:cNvSpPr>
+          <p:cNvPr id="5" name="Espace réservé du pied de page 4"/>
+          <p:cNvSpPr>
+            <a:spLocks noGrp="1"/>
+          </p:cNvSpPr>
+          <p:nvPr>
+            <p:ph type="ftr" sz="quarter" idx="11"/>
+          </p:nvPr>
+        </p:nvSpPr>
+        <p:spPr/>
+        <p:txBody>
+          <a:bodyPr/>
+          <a:lstStyle/>
+          <a:p>
+            <a:r>
+              <a:rPr lang="fr-CH" dirty="0" smtClean="0"/>
+              <a:t>Thierry </a:t>
+            </a:r>
+            <a:r>
+              <a:rPr lang="fr-CH" dirty="0" err="1" smtClean="0"/>
+              <a:t>Koetschet</a:t>
+            </a:r>
+            <a:r>
+              <a:rPr lang="fr-CH" dirty="0" smtClean="0"/>
+              <a:t> </a:t>
+            </a:r>
+          </a:p>
+          <a:p>
+            <a:r>
+              <a:rPr lang="fr-CH" dirty="0" smtClean="0"/>
+              <a:t>SI-CA2a</a:t>
+            </a:r>
+            <a:endParaRPr lang="fr-CH" dirty="0"/>
+          </a:p>
+        </p:txBody>
+      </p:sp>
+      <p:sp>
+        <p:nvSpPr>
+          <p:cNvPr id="6" name="Espace réservé du numéro de diapositive 5"/>
+          <p:cNvSpPr>
+            <a:spLocks noGrp="1"/>
+          </p:cNvSpPr>
+          <p:nvPr>
+            <p:ph type="sldNum" sz="quarter" idx="12"/>
+          </p:nvPr>
+        </p:nvSpPr>
+        <p:spPr/>
+        <p:txBody>
+          <a:bodyPr/>
+          <a:lstStyle/>
+          <a:p>
+            <a:fld id="{5ECE0F15-BD04-4B70-8AC1-6501C07CDE78}" type="slidenum">
+              <a:rPr lang="fr-CH" smtClean="0"/>
+              <a:t>12</a:t>
+            </a:fld>
+            <a:endParaRPr lang="fr-CH"/>
+          </a:p>
+        </p:txBody>
+      </p:sp>
+      <p:pic>
+        <p:nvPicPr>
+          <p:cNvPr id="4098" name="Picture 2" descr="NativeScript — Wikipédia"/>
+          <p:cNvPicPr>
+            <a:picLocks noGrp="1" noChangeAspect="1" noChangeArrowheads="1"/>
+          </p:cNvPicPr>
           <p:nvPr>
             <p:ph idx="1"/>
           </p:nvPr>
-        </p:nvSpPr>
-        <p:spPr/>
-        <p:txBody>
-          <a:bodyPr/>
-          <a:lstStyle/>
-          <a:p>
-            <a:endParaRPr lang="fr-CH"/>
-          </a:p>
-        </p:txBody>
-      </p:sp>
+        </p:nvPicPr>
+        <p:blipFill>
+          <a:blip r:embed="rId2" cstate="print">
+            <a:extLst>
+              <a:ext uri="{28A0092B-C50C-407E-A947-70E740481C1C}">
+                <a14:useLocalDpi xmlns:a14="http://schemas.microsoft.com/office/drawing/2010/main" val="0"/>
+              </a:ext>
+            </a:extLst>
+          </a:blip>
+          <a:srcRect/>
+          <a:stretch>
+            <a:fillRect/>
+          </a:stretch>
+        </p:blipFill>
+        <p:spPr bwMode="auto">
+          <a:xfrm>
+            <a:off x="3061435" y="1930400"/>
+            <a:ext cx="3726614" cy="3726614"/>
+          </a:xfrm>
+          <a:prstGeom prst="rect">
+            <a:avLst/>
+          </a:prstGeom>
+          <a:noFill/>
+          <a:extLst>
+            <a:ext uri="{909E8E84-426E-40DD-AFC4-6F175D3DCCD1}">
+              <a14:hiddenFill xmlns:a14="http://schemas.microsoft.com/office/drawing/2010/main">
+                <a:solidFill>
+                  <a:srgbClr val="FFFFFF"/>
+                </a:solidFill>
+              </a14:hiddenFill>
+            </a:ext>
+          </a:extLst>
+        </p:spPr>
+      </p:pic>
     </p:spTree>
     <p:extLst>
       <p:ext uri="{BB962C8B-B14F-4D97-AF65-F5344CB8AC3E}">
-        <p14:creationId xmlns:p14="http://schemas.microsoft.com/office/powerpoint/2010/main" val="2884682816"/>
+        <p14:creationId xmlns:p14="http://schemas.microsoft.com/office/powerpoint/2010/main" val="685445666"/>
       </p:ext>
     </p:extLst>
   </p:cSld>
   <p:clrMapOvr>
     <a:masterClrMapping/>
   </p:clrMapOvr>
+  <p:timing>
+    <p:tnLst>
+      <p:par>
+        <p:cTn id="1" dur="indefinite" restart="never" nodeType="tmRoot"/>
+      </p:par>
+    </p:tnLst>
+  </p:timing>
 </p:sld>
 </file>
 
@@ -6241,7 +7115,7 @@
           <a:p>
             <a:r>
               <a:rPr lang="fr-CH" dirty="0" smtClean="0"/>
-              <a:t>Conclusion</a:t>
+              <a:t>Conception</a:t>
             </a:r>
             <a:endParaRPr lang="fr-CH" dirty="0"/>
           </a:p>
@@ -6249,33 +7123,110 @@
       </p:sp>
       <p:sp>
         <p:nvSpPr>
-          <p:cNvPr id="3" name="Espace réservé du contenu 2"/>
-          <p:cNvSpPr>
-            <a:spLocks noGrp="1"/>
-          </p:cNvSpPr>
+          <p:cNvPr id="5" name="Espace réservé du pied de page 4"/>
+          <p:cNvSpPr>
+            <a:spLocks noGrp="1"/>
+          </p:cNvSpPr>
+          <p:nvPr>
+            <p:ph type="ftr" sz="quarter" idx="11"/>
+          </p:nvPr>
+        </p:nvSpPr>
+        <p:spPr/>
+        <p:txBody>
+          <a:bodyPr/>
+          <a:lstStyle/>
+          <a:p>
+            <a:r>
+              <a:rPr lang="fr-CH" dirty="0" smtClean="0"/>
+              <a:t>Thierry </a:t>
+            </a:r>
+            <a:r>
+              <a:rPr lang="fr-CH" dirty="0" err="1" smtClean="0"/>
+              <a:t>Koetschet</a:t>
+            </a:r>
+            <a:r>
+              <a:rPr lang="fr-CH" dirty="0" smtClean="0"/>
+              <a:t> </a:t>
+            </a:r>
+          </a:p>
+          <a:p>
+            <a:r>
+              <a:rPr lang="fr-CH" dirty="0" smtClean="0"/>
+              <a:t>SI-CA2a</a:t>
+            </a:r>
+            <a:endParaRPr lang="fr-CH" dirty="0"/>
+          </a:p>
+        </p:txBody>
+      </p:sp>
+      <p:sp>
+        <p:nvSpPr>
+          <p:cNvPr id="6" name="Espace réservé du numéro de diapositive 5"/>
+          <p:cNvSpPr>
+            <a:spLocks noGrp="1"/>
+          </p:cNvSpPr>
+          <p:nvPr>
+            <p:ph type="sldNum" sz="quarter" idx="12"/>
+          </p:nvPr>
+        </p:nvSpPr>
+        <p:spPr/>
+        <p:txBody>
+          <a:bodyPr/>
+          <a:lstStyle/>
+          <a:p>
+            <a:fld id="{5ECE0F15-BD04-4B70-8AC1-6501C07CDE78}" type="slidenum">
+              <a:rPr lang="fr-CH" smtClean="0"/>
+              <a:t>13</a:t>
+            </a:fld>
+            <a:endParaRPr lang="fr-CH"/>
+          </a:p>
+        </p:txBody>
+      </p:sp>
+      <p:pic>
+        <p:nvPicPr>
+          <p:cNvPr id="9" name="Espace réservé du contenu 8"/>
+          <p:cNvPicPr>
+            <a:picLocks noGrp="1" noChangeAspect="1"/>
+          </p:cNvPicPr>
           <p:nvPr>
             <p:ph idx="1"/>
           </p:nvPr>
-        </p:nvSpPr>
-        <p:spPr/>
-        <p:txBody>
-          <a:bodyPr/>
-          <a:lstStyle/>
-          <a:p>
-            <a:endParaRPr lang="fr-CH"/>
-          </a:p>
-        </p:txBody>
-      </p:sp>
+        </p:nvPicPr>
+        <p:blipFill>
+          <a:blip r:embed="rId2">
+            <a:extLst>
+              <a:ext uri="{28A0092B-C50C-407E-A947-70E740481C1C}">
+                <a14:useLocalDpi xmlns:a14="http://schemas.microsoft.com/office/drawing/2010/main" val="0"/>
+              </a:ext>
+            </a:extLst>
+          </a:blip>
+          <a:stretch>
+            <a:fillRect/>
+          </a:stretch>
+        </p:blipFill>
+        <p:spPr>
+          <a:xfrm>
+            <a:off x="1983804" y="1619590"/>
+            <a:ext cx="5983728" cy="4421772"/>
+          </a:xfrm>
+        </p:spPr>
+      </p:pic>
     </p:spTree>
     <p:extLst>
       <p:ext uri="{BB962C8B-B14F-4D97-AF65-F5344CB8AC3E}">
-        <p14:creationId xmlns:p14="http://schemas.microsoft.com/office/powerpoint/2010/main" val="4283421941"/>
+        <p14:creationId xmlns:p14="http://schemas.microsoft.com/office/powerpoint/2010/main" val="857158550"/>
       </p:ext>
     </p:extLst>
   </p:cSld>
   <p:clrMapOvr>
     <a:masterClrMapping/>
   </p:clrMapOvr>
+  <p:timing>
+    <p:tnLst>
+      <p:par>
+        <p:cTn id="1" dur="indefinite" restart="never" nodeType="tmRoot"/>
+      </p:par>
+    </p:tnLst>
+  </p:timing>
 </p:sld>
 </file>
 
@@ -6313,27 +7264,687 @@
           <a:p>
             <a:r>
               <a:rPr lang="fr-CH" dirty="0" smtClean="0"/>
+              <a:t>Conception</a:t>
+            </a:r>
+            <a:endParaRPr lang="fr-CH" dirty="0"/>
+          </a:p>
+        </p:txBody>
+      </p:sp>
+      <p:sp>
+        <p:nvSpPr>
+          <p:cNvPr id="5" name="Espace réservé du pied de page 4"/>
+          <p:cNvSpPr>
+            <a:spLocks noGrp="1"/>
+          </p:cNvSpPr>
+          <p:nvPr>
+            <p:ph type="ftr" sz="quarter" idx="11"/>
+          </p:nvPr>
+        </p:nvSpPr>
+        <p:spPr/>
+        <p:txBody>
+          <a:bodyPr/>
+          <a:lstStyle/>
+          <a:p>
+            <a:r>
+              <a:rPr lang="fr-CH" dirty="0" smtClean="0"/>
+              <a:t>Thierry </a:t>
+            </a:r>
+            <a:r>
+              <a:rPr lang="fr-CH" dirty="0" err="1" smtClean="0"/>
+              <a:t>Koetschet</a:t>
+            </a:r>
+            <a:r>
+              <a:rPr lang="fr-CH" dirty="0" smtClean="0"/>
+              <a:t> </a:t>
+            </a:r>
+          </a:p>
+          <a:p>
+            <a:r>
+              <a:rPr lang="fr-CH" dirty="0" smtClean="0"/>
+              <a:t>SI-CA2a</a:t>
+            </a:r>
+            <a:endParaRPr lang="fr-CH" dirty="0"/>
+          </a:p>
+        </p:txBody>
+      </p:sp>
+      <p:sp>
+        <p:nvSpPr>
+          <p:cNvPr id="6" name="Espace réservé du numéro de diapositive 5"/>
+          <p:cNvSpPr>
+            <a:spLocks noGrp="1"/>
+          </p:cNvSpPr>
+          <p:nvPr>
+            <p:ph type="sldNum" sz="quarter" idx="12"/>
+          </p:nvPr>
+        </p:nvSpPr>
+        <p:spPr/>
+        <p:txBody>
+          <a:bodyPr/>
+          <a:lstStyle/>
+          <a:p>
+            <a:fld id="{5ECE0F15-BD04-4B70-8AC1-6501C07CDE78}" type="slidenum">
+              <a:rPr lang="fr-CH" smtClean="0"/>
+              <a:t>14</a:t>
+            </a:fld>
+            <a:endParaRPr lang="fr-CH"/>
+          </a:p>
+        </p:txBody>
+      </p:sp>
+      <p:pic>
+        <p:nvPicPr>
+          <p:cNvPr id="4" name="Espace réservé du contenu 3"/>
+          <p:cNvPicPr>
+            <a:picLocks noGrp="1" noChangeAspect="1"/>
+          </p:cNvPicPr>
+          <p:nvPr>
+            <p:ph idx="1"/>
+          </p:nvPr>
+        </p:nvPicPr>
+        <p:blipFill>
+          <a:blip r:embed="rId2"/>
+          <a:stretch>
+            <a:fillRect/>
+          </a:stretch>
+        </p:blipFill>
+        <p:spPr>
+          <a:xfrm>
+            <a:off x="2396850" y="1839163"/>
+            <a:ext cx="6193813" cy="4293436"/>
+          </a:xfrm>
+          <a:prstGeom prst="rect">
+            <a:avLst/>
+          </a:prstGeom>
+        </p:spPr>
+      </p:pic>
+    </p:spTree>
+    <p:extLst>
+      <p:ext uri="{BB962C8B-B14F-4D97-AF65-F5344CB8AC3E}">
+        <p14:creationId xmlns:p14="http://schemas.microsoft.com/office/powerpoint/2010/main" val="147272545"/>
+      </p:ext>
+    </p:extLst>
+  </p:cSld>
+  <p:clrMapOvr>
+    <a:masterClrMapping/>
+  </p:clrMapOvr>
+  <p:timing>
+    <p:tnLst>
+      <p:par>
+        <p:cTn id="1" dur="indefinite" restart="never" nodeType="tmRoot"/>
+      </p:par>
+    </p:tnLst>
+  </p:timing>
+</p:sld>
+</file>
+
+<file path=ppt/slides/slide15.xml><?xml version="1.0" encoding="utf-8"?>
+<p:sld xmlns:a="http://schemas.openxmlformats.org/drawingml/2006/main" xmlns:r="http://schemas.openxmlformats.org/officeDocument/2006/relationships" xmlns:p="http://schemas.openxmlformats.org/presentationml/2006/main">
+  <p:cSld>
+    <p:spTree>
+      <p:nvGrpSpPr>
+        <p:cNvPr id="1" name=""/>
+        <p:cNvGrpSpPr/>
+        <p:nvPr/>
+      </p:nvGrpSpPr>
+      <p:grpSpPr>
+        <a:xfrm>
+          <a:off x="0" y="0"/>
+          <a:ext cx="0" cy="0"/>
+          <a:chOff x="0" y="0"/>
+          <a:chExt cx="0" cy="0"/>
+        </a:xfrm>
+      </p:grpSpPr>
+      <p:sp>
+        <p:nvSpPr>
+          <p:cNvPr id="2" name="Titre 1"/>
+          <p:cNvSpPr>
+            <a:spLocks noGrp="1"/>
+          </p:cNvSpPr>
+          <p:nvPr>
+            <p:ph type="title"/>
+          </p:nvPr>
+        </p:nvSpPr>
+        <p:spPr/>
+        <p:txBody>
+          <a:bodyPr/>
+          <a:lstStyle/>
+          <a:p>
+            <a:r>
+              <a:rPr lang="fr-CH" dirty="0" smtClean="0"/>
+              <a:t>Réalisation</a:t>
+            </a:r>
+            <a:endParaRPr lang="fr-CH" dirty="0"/>
+          </a:p>
+        </p:txBody>
+      </p:sp>
+      <p:sp>
+        <p:nvSpPr>
+          <p:cNvPr id="3" name="Espace réservé du contenu 2"/>
+          <p:cNvSpPr>
+            <a:spLocks noGrp="1"/>
+          </p:cNvSpPr>
+          <p:nvPr>
+            <p:ph idx="1"/>
+          </p:nvPr>
+        </p:nvSpPr>
+        <p:spPr/>
+        <p:txBody>
+          <a:bodyPr/>
+          <a:lstStyle/>
+          <a:p>
+            <a:endParaRPr lang="fr-CH"/>
+          </a:p>
+        </p:txBody>
+      </p:sp>
+      <p:sp>
+        <p:nvSpPr>
+          <p:cNvPr id="5" name="Espace réservé du pied de page 4"/>
+          <p:cNvSpPr>
+            <a:spLocks noGrp="1"/>
+          </p:cNvSpPr>
+          <p:nvPr>
+            <p:ph type="ftr" sz="quarter" idx="11"/>
+          </p:nvPr>
+        </p:nvSpPr>
+        <p:spPr/>
+        <p:txBody>
+          <a:bodyPr/>
+          <a:lstStyle/>
+          <a:p>
+            <a:r>
+              <a:rPr lang="fr-CH" dirty="0" smtClean="0"/>
+              <a:t>Thierry </a:t>
+            </a:r>
+            <a:r>
+              <a:rPr lang="fr-CH" dirty="0" err="1" smtClean="0"/>
+              <a:t>Koetschet</a:t>
+            </a:r>
+            <a:r>
+              <a:rPr lang="fr-CH" dirty="0" smtClean="0"/>
+              <a:t> </a:t>
+            </a:r>
+          </a:p>
+          <a:p>
+            <a:r>
+              <a:rPr lang="fr-CH" dirty="0" smtClean="0"/>
+              <a:t>SI-CA2a</a:t>
+            </a:r>
+            <a:endParaRPr lang="fr-CH" dirty="0"/>
+          </a:p>
+        </p:txBody>
+      </p:sp>
+      <p:sp>
+        <p:nvSpPr>
+          <p:cNvPr id="6" name="Espace réservé du numéro de diapositive 5"/>
+          <p:cNvSpPr>
+            <a:spLocks noGrp="1"/>
+          </p:cNvSpPr>
+          <p:nvPr>
+            <p:ph type="sldNum" sz="quarter" idx="12"/>
+          </p:nvPr>
+        </p:nvSpPr>
+        <p:spPr/>
+        <p:txBody>
+          <a:bodyPr/>
+          <a:lstStyle/>
+          <a:p>
+            <a:fld id="{5ECE0F15-BD04-4B70-8AC1-6501C07CDE78}" type="slidenum">
+              <a:rPr lang="fr-CH" smtClean="0"/>
+              <a:t>15</a:t>
+            </a:fld>
+            <a:endParaRPr lang="fr-CH"/>
+          </a:p>
+        </p:txBody>
+      </p:sp>
+    </p:spTree>
+    <p:extLst>
+      <p:ext uri="{BB962C8B-B14F-4D97-AF65-F5344CB8AC3E}">
+        <p14:creationId xmlns:p14="http://schemas.microsoft.com/office/powerpoint/2010/main" val="1790757678"/>
+      </p:ext>
+    </p:extLst>
+  </p:cSld>
+  <p:clrMapOvr>
+    <a:masterClrMapping/>
+  </p:clrMapOvr>
+  <p:timing>
+    <p:tnLst>
+      <p:par>
+        <p:cTn id="1" dur="indefinite" restart="never" nodeType="tmRoot"/>
+      </p:par>
+    </p:tnLst>
+  </p:timing>
+</p:sld>
+</file>
+
+<file path=ppt/slides/slide16.xml><?xml version="1.0" encoding="utf-8"?>
+<p:sld xmlns:a="http://schemas.openxmlformats.org/drawingml/2006/main" xmlns:r="http://schemas.openxmlformats.org/officeDocument/2006/relationships" xmlns:p="http://schemas.openxmlformats.org/presentationml/2006/main">
+  <p:cSld>
+    <p:spTree>
+      <p:nvGrpSpPr>
+        <p:cNvPr id="1" name=""/>
+        <p:cNvGrpSpPr/>
+        <p:nvPr/>
+      </p:nvGrpSpPr>
+      <p:grpSpPr>
+        <a:xfrm>
+          <a:off x="0" y="0"/>
+          <a:ext cx="0" cy="0"/>
+          <a:chOff x="0" y="0"/>
+          <a:chExt cx="0" cy="0"/>
+        </a:xfrm>
+      </p:grpSpPr>
+      <p:sp>
+        <p:nvSpPr>
+          <p:cNvPr id="2" name="Titre 1"/>
+          <p:cNvSpPr>
+            <a:spLocks noGrp="1"/>
+          </p:cNvSpPr>
+          <p:nvPr>
+            <p:ph type="title"/>
+          </p:nvPr>
+        </p:nvSpPr>
+        <p:spPr/>
+        <p:txBody>
+          <a:bodyPr/>
+          <a:lstStyle/>
+          <a:p>
+            <a:r>
+              <a:rPr lang="fr-CH" dirty="0" smtClean="0"/>
+              <a:t>Démonstration de l’application</a:t>
+            </a:r>
+            <a:endParaRPr lang="fr-CH" dirty="0"/>
+          </a:p>
+        </p:txBody>
+      </p:sp>
+      <p:pic>
+        <p:nvPicPr>
+          <p:cNvPr id="7" name="Espace réservé du contenu 6"/>
+          <p:cNvPicPr>
+            <a:picLocks noGrp="1" noChangeAspect="1"/>
+          </p:cNvPicPr>
+          <p:nvPr>
+            <p:ph idx="1"/>
+          </p:nvPr>
+        </p:nvPicPr>
+        <p:blipFill rotWithShape="1">
+          <a:blip r:embed="rId2"/>
+          <a:srcRect b="49446"/>
+          <a:stretch/>
+        </p:blipFill>
+        <p:spPr>
+          <a:xfrm>
+            <a:off x="2919416" y="1506123"/>
+            <a:ext cx="4612468" cy="4535239"/>
+          </a:xfrm>
+          <a:prstGeom prst="rect">
+            <a:avLst/>
+          </a:prstGeom>
+        </p:spPr>
+      </p:pic>
+      <p:sp>
+        <p:nvSpPr>
+          <p:cNvPr id="5" name="Espace réservé du pied de page 4"/>
+          <p:cNvSpPr>
+            <a:spLocks noGrp="1"/>
+          </p:cNvSpPr>
+          <p:nvPr>
+            <p:ph type="ftr" sz="quarter" idx="11"/>
+          </p:nvPr>
+        </p:nvSpPr>
+        <p:spPr/>
+        <p:txBody>
+          <a:bodyPr/>
+          <a:lstStyle/>
+          <a:p>
+            <a:r>
+              <a:rPr lang="fr-CH" dirty="0" smtClean="0"/>
+              <a:t>Thierry </a:t>
+            </a:r>
+            <a:r>
+              <a:rPr lang="fr-CH" dirty="0" err="1" smtClean="0"/>
+              <a:t>Koetschet</a:t>
+            </a:r>
+            <a:r>
+              <a:rPr lang="fr-CH" dirty="0" smtClean="0"/>
+              <a:t> </a:t>
+            </a:r>
+          </a:p>
+          <a:p>
+            <a:r>
+              <a:rPr lang="fr-CH" dirty="0" smtClean="0"/>
+              <a:t>SI-CA2a</a:t>
+            </a:r>
+            <a:endParaRPr lang="fr-CH" dirty="0"/>
+          </a:p>
+        </p:txBody>
+      </p:sp>
+      <p:sp>
+        <p:nvSpPr>
+          <p:cNvPr id="6" name="Espace réservé du numéro de diapositive 5"/>
+          <p:cNvSpPr>
+            <a:spLocks noGrp="1"/>
+          </p:cNvSpPr>
+          <p:nvPr>
+            <p:ph type="sldNum" sz="quarter" idx="12"/>
+          </p:nvPr>
+        </p:nvSpPr>
+        <p:spPr/>
+        <p:txBody>
+          <a:bodyPr/>
+          <a:lstStyle/>
+          <a:p>
+            <a:fld id="{5ECE0F15-BD04-4B70-8AC1-6501C07CDE78}" type="slidenum">
+              <a:rPr lang="fr-CH" smtClean="0"/>
+              <a:t>16</a:t>
+            </a:fld>
+            <a:endParaRPr lang="fr-CH"/>
+          </a:p>
+        </p:txBody>
+      </p:sp>
+    </p:spTree>
+    <p:extLst>
+      <p:ext uri="{BB962C8B-B14F-4D97-AF65-F5344CB8AC3E}">
+        <p14:creationId xmlns:p14="http://schemas.microsoft.com/office/powerpoint/2010/main" val="2884682816"/>
+      </p:ext>
+    </p:extLst>
+  </p:cSld>
+  <p:clrMapOvr>
+    <a:masterClrMapping/>
+  </p:clrMapOvr>
+  <p:timing>
+    <p:tnLst>
+      <p:par>
+        <p:cTn id="1" dur="indefinite" restart="never" nodeType="tmRoot"/>
+      </p:par>
+    </p:tnLst>
+  </p:timing>
+</p:sld>
+</file>
+
+<file path=ppt/slides/slide17.xml><?xml version="1.0" encoding="utf-8"?>
+<p:sld xmlns:a="http://schemas.openxmlformats.org/drawingml/2006/main" xmlns:r="http://schemas.openxmlformats.org/officeDocument/2006/relationships" xmlns:p="http://schemas.openxmlformats.org/presentationml/2006/main">
+  <p:cSld>
+    <p:spTree>
+      <p:nvGrpSpPr>
+        <p:cNvPr id="1" name=""/>
+        <p:cNvGrpSpPr/>
+        <p:nvPr/>
+      </p:nvGrpSpPr>
+      <p:grpSpPr>
+        <a:xfrm>
+          <a:off x="0" y="0"/>
+          <a:ext cx="0" cy="0"/>
+          <a:chOff x="0" y="0"/>
+          <a:chExt cx="0" cy="0"/>
+        </a:xfrm>
+      </p:grpSpPr>
+      <p:sp>
+        <p:nvSpPr>
+          <p:cNvPr id="2" name="Titre 1"/>
+          <p:cNvSpPr>
+            <a:spLocks noGrp="1"/>
+          </p:cNvSpPr>
+          <p:nvPr>
+            <p:ph type="title"/>
+          </p:nvPr>
+        </p:nvSpPr>
+        <p:spPr/>
+        <p:txBody>
+          <a:bodyPr/>
+          <a:lstStyle/>
+          <a:p>
+            <a:r>
+              <a:rPr lang="fr-CH" dirty="0" smtClean="0"/>
+              <a:t>Conclusion</a:t>
+            </a:r>
+            <a:endParaRPr lang="fr-CH" dirty="0"/>
+          </a:p>
+        </p:txBody>
+      </p:sp>
+      <p:sp>
+        <p:nvSpPr>
+          <p:cNvPr id="3" name="Espace réservé du contenu 2"/>
+          <p:cNvSpPr>
+            <a:spLocks noGrp="1"/>
+          </p:cNvSpPr>
+          <p:nvPr>
+            <p:ph idx="1"/>
+          </p:nvPr>
+        </p:nvSpPr>
+        <p:spPr/>
+        <p:txBody>
+          <a:bodyPr>
+            <a:normAutofit/>
+          </a:bodyPr>
+          <a:lstStyle/>
+          <a:p>
+            <a:r>
+              <a:rPr lang="fr-CH" sz="2800" dirty="0" smtClean="0"/>
+              <a:t>Objectifs</a:t>
+            </a:r>
+          </a:p>
+          <a:p>
+            <a:r>
+              <a:rPr lang="fr-CH" sz="2800" dirty="0" smtClean="0"/>
+              <a:t>Produit fini</a:t>
+            </a:r>
+          </a:p>
+          <a:p>
+            <a:r>
+              <a:rPr lang="fr-CH" sz="2800" dirty="0" smtClean="0"/>
+              <a:t>Changement de TPI</a:t>
+            </a:r>
+          </a:p>
+          <a:p>
+            <a:r>
+              <a:rPr lang="fr-CH" sz="2800" dirty="0" smtClean="0"/>
+              <a:t>Point positifs</a:t>
+            </a:r>
+            <a:endParaRPr lang="fr-CH" sz="2800" dirty="0"/>
+          </a:p>
+        </p:txBody>
+      </p:sp>
+      <p:sp>
+        <p:nvSpPr>
+          <p:cNvPr id="5" name="Espace réservé du pied de page 4"/>
+          <p:cNvSpPr>
+            <a:spLocks noGrp="1"/>
+          </p:cNvSpPr>
+          <p:nvPr>
+            <p:ph type="ftr" sz="quarter" idx="11"/>
+          </p:nvPr>
+        </p:nvSpPr>
+        <p:spPr/>
+        <p:txBody>
+          <a:bodyPr/>
+          <a:lstStyle/>
+          <a:p>
+            <a:r>
+              <a:rPr lang="fr-CH" dirty="0" smtClean="0"/>
+              <a:t>Thierry </a:t>
+            </a:r>
+            <a:r>
+              <a:rPr lang="fr-CH" dirty="0" err="1" smtClean="0"/>
+              <a:t>Koetschet</a:t>
+            </a:r>
+            <a:r>
+              <a:rPr lang="fr-CH" dirty="0" smtClean="0"/>
+              <a:t> </a:t>
+            </a:r>
+          </a:p>
+          <a:p>
+            <a:r>
+              <a:rPr lang="fr-CH" dirty="0" smtClean="0"/>
+              <a:t>SI-CA2a</a:t>
+            </a:r>
+            <a:endParaRPr lang="fr-CH" dirty="0"/>
+          </a:p>
+        </p:txBody>
+      </p:sp>
+      <p:sp>
+        <p:nvSpPr>
+          <p:cNvPr id="6" name="Espace réservé du numéro de diapositive 5"/>
+          <p:cNvSpPr>
+            <a:spLocks noGrp="1"/>
+          </p:cNvSpPr>
+          <p:nvPr>
+            <p:ph type="sldNum" sz="quarter" idx="12"/>
+          </p:nvPr>
+        </p:nvSpPr>
+        <p:spPr/>
+        <p:txBody>
+          <a:bodyPr/>
+          <a:lstStyle/>
+          <a:p>
+            <a:fld id="{5ECE0F15-BD04-4B70-8AC1-6501C07CDE78}" type="slidenum">
+              <a:rPr lang="fr-CH" smtClean="0"/>
+              <a:t>17</a:t>
+            </a:fld>
+            <a:endParaRPr lang="fr-CH"/>
+          </a:p>
+        </p:txBody>
+      </p:sp>
+    </p:spTree>
+    <p:extLst>
+      <p:ext uri="{BB962C8B-B14F-4D97-AF65-F5344CB8AC3E}">
+        <p14:creationId xmlns:p14="http://schemas.microsoft.com/office/powerpoint/2010/main" val="4283421941"/>
+      </p:ext>
+    </p:extLst>
+  </p:cSld>
+  <p:clrMapOvr>
+    <a:masterClrMapping/>
+  </p:clrMapOvr>
+  <p:timing>
+    <p:tnLst>
+      <p:par>
+        <p:cTn id="1" dur="indefinite" restart="never" nodeType="tmRoot"/>
+      </p:par>
+    </p:tnLst>
+  </p:timing>
+</p:sld>
+</file>
+
+<file path=ppt/slides/slide18.xml><?xml version="1.0" encoding="utf-8"?>
+<p:sld xmlns:a="http://schemas.openxmlformats.org/drawingml/2006/main" xmlns:r="http://schemas.openxmlformats.org/officeDocument/2006/relationships" xmlns:p="http://schemas.openxmlformats.org/presentationml/2006/main">
+  <p:cSld>
+    <p:spTree>
+      <p:nvGrpSpPr>
+        <p:cNvPr id="1" name=""/>
+        <p:cNvGrpSpPr/>
+        <p:nvPr/>
+      </p:nvGrpSpPr>
+      <p:grpSpPr>
+        <a:xfrm>
+          <a:off x="0" y="0"/>
+          <a:ext cx="0" cy="0"/>
+          <a:chOff x="0" y="0"/>
+          <a:chExt cx="0" cy="0"/>
+        </a:xfrm>
+      </p:grpSpPr>
+      <p:sp>
+        <p:nvSpPr>
+          <p:cNvPr id="2" name="Titre 1"/>
+          <p:cNvSpPr>
+            <a:spLocks noGrp="1"/>
+          </p:cNvSpPr>
+          <p:nvPr>
+            <p:ph type="title"/>
+          </p:nvPr>
+        </p:nvSpPr>
+        <p:spPr>
+          <a:xfrm>
+            <a:off x="3115734" y="2646947"/>
+            <a:ext cx="8596668" cy="1320800"/>
+          </a:xfrm>
+        </p:spPr>
+        <p:txBody>
+          <a:bodyPr>
+            <a:noAutofit/>
+          </a:bodyPr>
+          <a:lstStyle/>
+          <a:p>
+            <a:r>
+              <a:rPr lang="fr-CH" sz="8800" dirty="0" smtClean="0"/>
               <a:t>Questions</a:t>
             </a:r>
+            <a:endParaRPr lang="fr-CH" sz="8800" dirty="0"/>
+          </a:p>
+        </p:txBody>
+      </p:sp>
+      <p:sp>
+        <p:nvSpPr>
+          <p:cNvPr id="3" name="Espace réservé du contenu 2"/>
+          <p:cNvSpPr>
+            <a:spLocks noGrp="1"/>
+          </p:cNvSpPr>
+          <p:nvPr>
+            <p:ph idx="1"/>
+          </p:nvPr>
+        </p:nvSpPr>
+        <p:spPr/>
+        <p:txBody>
+          <a:bodyPr/>
+          <a:lstStyle/>
+          <a:p>
+            <a:endParaRPr lang="fr-CH"/>
+          </a:p>
+        </p:txBody>
+      </p:sp>
+      <p:sp>
+        <p:nvSpPr>
+          <p:cNvPr id="5" name="Espace réservé du pied de page 4"/>
+          <p:cNvSpPr>
+            <a:spLocks noGrp="1"/>
+          </p:cNvSpPr>
+          <p:nvPr>
+            <p:ph type="ftr" sz="quarter" idx="11"/>
+          </p:nvPr>
+        </p:nvSpPr>
+        <p:spPr/>
+        <p:txBody>
+          <a:bodyPr/>
+          <a:lstStyle/>
+          <a:p>
+            <a:r>
+              <a:rPr lang="fr-CH" dirty="0" smtClean="0"/>
+              <a:t>Thierry </a:t>
+            </a:r>
+            <a:r>
+              <a:rPr lang="fr-CH" dirty="0" err="1" smtClean="0"/>
+              <a:t>Koetschet</a:t>
+            </a:r>
+            <a:r>
+              <a:rPr lang="fr-CH" dirty="0" smtClean="0"/>
+              <a:t> </a:t>
+            </a:r>
+          </a:p>
+          <a:p>
+            <a:r>
+              <a:rPr lang="fr-CH" dirty="0" smtClean="0"/>
+              <a:t>SI-CA2a</a:t>
+            </a:r>
             <a:endParaRPr lang="fr-CH" dirty="0"/>
           </a:p>
         </p:txBody>
       </p:sp>
       <p:sp>
         <p:nvSpPr>
-          <p:cNvPr id="3" name="Espace réservé du contenu 2"/>
-          <p:cNvSpPr>
-            <a:spLocks noGrp="1"/>
-          </p:cNvSpPr>
-          <p:nvPr>
-            <p:ph idx="1"/>
-          </p:nvPr>
-        </p:nvSpPr>
-        <p:spPr/>
-        <p:txBody>
-          <a:bodyPr/>
-          <a:lstStyle/>
-          <a:p>
+          <p:cNvPr id="6" name="Espace réservé du numéro de diapositive 5"/>
+          <p:cNvSpPr>
+            <a:spLocks noGrp="1"/>
+          </p:cNvSpPr>
+          <p:nvPr>
+            <p:ph type="sldNum" sz="quarter" idx="12"/>
+          </p:nvPr>
+        </p:nvSpPr>
+        <p:spPr/>
+        <p:txBody>
+          <a:bodyPr/>
+          <a:lstStyle/>
+          <a:p>
+            <a:fld id="{5ECE0F15-BD04-4B70-8AC1-6501C07CDE78}" type="slidenum">
+              <a:rPr lang="fr-CH" smtClean="0"/>
+              <a:t>18</a:t>
+            </a:fld>
             <a:endParaRPr lang="fr-CH"/>
           </a:p>
         </p:txBody>
@@ -6348,6 +7959,13 @@
   <p:clrMapOvr>
     <a:masterClrMapping/>
   </p:clrMapOvr>
+  <p:timing>
+    <p:tnLst>
+      <p:par>
+        <p:cTn id="1" dur="indefinite" restart="never" nodeType="tmRoot"/>
+      </p:par>
+    </p:tnLst>
+  </p:timing>
 </p:sld>
 </file>
 
@@ -6456,6 +8074,66 @@
           </a:p>
         </p:txBody>
       </p:sp>
+      <p:sp>
+        <p:nvSpPr>
+          <p:cNvPr id="5" name="Espace réservé du pied de page 4"/>
+          <p:cNvSpPr>
+            <a:spLocks noGrp="1"/>
+          </p:cNvSpPr>
+          <p:nvPr>
+            <p:ph type="ftr" sz="quarter" idx="11"/>
+          </p:nvPr>
+        </p:nvSpPr>
+        <p:spPr/>
+        <p:txBody>
+          <a:bodyPr/>
+          <a:lstStyle/>
+          <a:p>
+            <a:r>
+              <a:rPr lang="fr-CH" dirty="0" smtClean="0"/>
+              <a:t>Thierry </a:t>
+            </a:r>
+            <a:r>
+              <a:rPr lang="fr-CH" dirty="0" err="1" smtClean="0"/>
+              <a:t>Koetschet</a:t>
+            </a:r>
+            <a:r>
+              <a:rPr lang="fr-CH" dirty="0" smtClean="0"/>
+              <a:t> </a:t>
+            </a:r>
+          </a:p>
+          <a:p>
+            <a:r>
+              <a:rPr lang="fr-CH" dirty="0" smtClean="0"/>
+              <a:t>SI-CA2a</a:t>
+            </a:r>
+            <a:endParaRPr lang="fr-CH" dirty="0"/>
+          </a:p>
+        </p:txBody>
+      </p:sp>
+      <p:sp>
+        <p:nvSpPr>
+          <p:cNvPr id="6" name="Espace réservé du numéro de diapositive 5"/>
+          <p:cNvSpPr>
+            <a:spLocks noGrp="1"/>
+          </p:cNvSpPr>
+          <p:nvPr>
+            <p:ph type="sldNum" sz="quarter" idx="12"/>
+          </p:nvPr>
+        </p:nvSpPr>
+        <p:spPr/>
+        <p:txBody>
+          <a:bodyPr/>
+          <a:lstStyle/>
+          <a:p>
+            <a:fld id="{5ECE0F15-BD04-4B70-8AC1-6501C07CDE78}" type="slidenum">
+              <a:rPr lang="fr-CH" smtClean="0"/>
+              <a:t>2</a:t>
+            </a:fld>
+            <a:endParaRPr lang="fr-CH"/>
+          </a:p>
+        </p:txBody>
+      </p:sp>
     </p:spTree>
     <p:extLst>
       <p:ext uri="{BB962C8B-B14F-4D97-AF65-F5344CB8AC3E}">
@@ -6466,6 +8144,13 @@
   <p:clrMapOvr>
     <a:masterClrMapping/>
   </p:clrMapOvr>
+  <p:timing>
+    <p:tnLst>
+      <p:par>
+        <p:cTn id="1" dur="indefinite" restart="never" nodeType="tmRoot"/>
+      </p:par>
+    </p:tnLst>
+  </p:timing>
 </p:sld>
 </file>
 
@@ -6551,8 +8236,79 @@
           <a:p>
             <a:r>
               <a:rPr lang="fr-CH" dirty="0" smtClean="0"/>
-              <a:t>Raison du choix de ce projet</a:t>
-            </a:r>
+              <a:t>Raison du choix de ce </a:t>
+            </a:r>
+            <a:r>
+              <a:rPr lang="fr-CH" dirty="0" smtClean="0"/>
+              <a:t>projet</a:t>
+            </a:r>
+          </a:p>
+          <a:p>
+            <a:r>
+              <a:rPr lang="fr-CH" dirty="0" smtClean="0"/>
+              <a:t>Objectifs</a:t>
+            </a:r>
+            <a:endParaRPr lang="fr-CH" dirty="0" smtClean="0"/>
+          </a:p>
+        </p:txBody>
+      </p:sp>
+      <p:sp>
+        <p:nvSpPr>
+          <p:cNvPr id="5" name="Espace réservé du pied de page 4"/>
+          <p:cNvSpPr>
+            <a:spLocks noGrp="1"/>
+          </p:cNvSpPr>
+          <p:nvPr>
+            <p:ph type="ftr" sz="quarter" idx="11"/>
+          </p:nvPr>
+        </p:nvSpPr>
+        <p:spPr/>
+        <p:txBody>
+          <a:bodyPr/>
+          <a:lstStyle/>
+          <a:p>
+            <a:r>
+              <a:rPr lang="fr-CH" dirty="0" smtClean="0"/>
+              <a:t>Thierry </a:t>
+            </a:r>
+            <a:r>
+              <a:rPr lang="fr-CH" dirty="0" err="1" smtClean="0"/>
+              <a:t>Koetschet</a:t>
+            </a:r>
+            <a:r>
+              <a:rPr lang="fr-CH" dirty="0" smtClean="0"/>
+              <a:t> </a:t>
+            </a:r>
+          </a:p>
+          <a:p>
+            <a:r>
+              <a:rPr lang="fr-CH" dirty="0" smtClean="0"/>
+              <a:t>SI-CA2a</a:t>
+            </a:r>
+            <a:endParaRPr lang="fr-CH" dirty="0"/>
+          </a:p>
+        </p:txBody>
+      </p:sp>
+      <p:sp>
+        <p:nvSpPr>
+          <p:cNvPr id="6" name="Espace réservé du numéro de diapositive 5"/>
+          <p:cNvSpPr>
+            <a:spLocks noGrp="1"/>
+          </p:cNvSpPr>
+          <p:nvPr>
+            <p:ph type="sldNum" sz="quarter" idx="12"/>
+          </p:nvPr>
+        </p:nvSpPr>
+        <p:spPr/>
+        <p:txBody>
+          <a:bodyPr/>
+          <a:lstStyle/>
+          <a:p>
+            <a:fld id="{5ECE0F15-BD04-4B70-8AC1-6501C07CDE78}" type="slidenum">
+              <a:rPr lang="fr-CH" smtClean="0"/>
+              <a:t>3</a:t>
+            </a:fld>
+            <a:endParaRPr lang="fr-CH"/>
           </a:p>
         </p:txBody>
       </p:sp>
@@ -6636,7 +8392,11 @@
             </a:pPr>
             <a:r>
               <a:rPr lang="fr-CH" dirty="0" smtClean="0"/>
-              <a:t>Deux grandes parties :</a:t>
+              <a:t>Deux </a:t>
+            </a:r>
+            <a:r>
+              <a:rPr lang="fr-CH" dirty="0" smtClean="0"/>
+              <a:t>grandes parties :</a:t>
             </a:r>
           </a:p>
           <a:p>
@@ -6659,6 +8419,63 @@
               <a:t>Réalisation d’une application mobile</a:t>
             </a:r>
             <a:endParaRPr lang="fr-CH" dirty="0"/>
+          </a:p>
+        </p:txBody>
+      </p:sp>
+      <p:sp>
+        <p:nvSpPr>
+          <p:cNvPr id="5" name="Espace réservé du pied de page 4"/>
+          <p:cNvSpPr>
+            <a:spLocks noGrp="1"/>
+          </p:cNvSpPr>
+          <p:nvPr>
+            <p:ph type="ftr" sz="quarter" idx="11"/>
+          </p:nvPr>
+        </p:nvSpPr>
+        <p:spPr/>
+        <p:txBody>
+          <a:bodyPr/>
+          <a:lstStyle/>
+          <a:p>
+            <a:r>
+              <a:rPr lang="fr-CH" dirty="0" smtClean="0"/>
+              <a:t>Thierry </a:t>
+            </a:r>
+            <a:r>
+              <a:rPr lang="fr-CH" dirty="0" err="1" smtClean="0"/>
+              <a:t>Koetschet</a:t>
+            </a:r>
+            <a:endParaRPr lang="fr-CH" dirty="0" smtClean="0"/>
+          </a:p>
+          <a:p>
+            <a:r>
+              <a:rPr lang="fr-CH" dirty="0" smtClean="0"/>
+              <a:t>SI-CA2a</a:t>
+            </a:r>
+            <a:endParaRPr lang="fr-CH" dirty="0"/>
+          </a:p>
+        </p:txBody>
+      </p:sp>
+      <p:sp>
+        <p:nvSpPr>
+          <p:cNvPr id="6" name="Espace réservé du numéro de diapositive 5"/>
+          <p:cNvSpPr>
+            <a:spLocks noGrp="1"/>
+          </p:cNvSpPr>
+          <p:nvPr>
+            <p:ph type="sldNum" sz="quarter" idx="12"/>
+          </p:nvPr>
+        </p:nvSpPr>
+        <p:spPr/>
+        <p:txBody>
+          <a:bodyPr/>
+          <a:lstStyle/>
+          <a:p>
+            <a:fld id="{5ECE0F15-BD04-4B70-8AC1-6501C07CDE78}" type="slidenum">
+              <a:rPr lang="fr-CH" smtClean="0"/>
+              <a:t>4</a:t>
+            </a:fld>
+            <a:endParaRPr lang="fr-CH"/>
           </a:p>
         </p:txBody>
       </p:sp>
@@ -6758,6 +8575,66 @@
           </a:ln>
         </p:spPr>
       </p:pic>
+      <p:sp>
+        <p:nvSpPr>
+          <p:cNvPr id="3" name="Espace réservé du pied de page 2"/>
+          <p:cNvSpPr>
+            <a:spLocks noGrp="1"/>
+          </p:cNvSpPr>
+          <p:nvPr>
+            <p:ph type="ftr" sz="quarter" idx="11"/>
+          </p:nvPr>
+        </p:nvSpPr>
+        <p:spPr/>
+        <p:txBody>
+          <a:bodyPr/>
+          <a:lstStyle/>
+          <a:p>
+            <a:r>
+              <a:rPr lang="fr-CH" dirty="0" smtClean="0"/>
+              <a:t>Thierry </a:t>
+            </a:r>
+            <a:r>
+              <a:rPr lang="fr-CH" dirty="0" err="1" smtClean="0"/>
+              <a:t>Koetschet</a:t>
+            </a:r>
+            <a:r>
+              <a:rPr lang="fr-CH" dirty="0" smtClean="0"/>
+              <a:t> </a:t>
+            </a:r>
+          </a:p>
+          <a:p>
+            <a:r>
+              <a:rPr lang="fr-CH" dirty="0" smtClean="0"/>
+              <a:t>SI-CA2a</a:t>
+            </a:r>
+            <a:endParaRPr lang="fr-CH" dirty="0"/>
+          </a:p>
+        </p:txBody>
+      </p:sp>
+      <p:sp>
+        <p:nvSpPr>
+          <p:cNvPr id="6" name="Espace réservé du numéro de diapositive 5"/>
+          <p:cNvSpPr>
+            <a:spLocks noGrp="1"/>
+          </p:cNvSpPr>
+          <p:nvPr>
+            <p:ph type="sldNum" sz="quarter" idx="12"/>
+          </p:nvPr>
+        </p:nvSpPr>
+        <p:spPr/>
+        <p:txBody>
+          <a:bodyPr/>
+          <a:lstStyle/>
+          <a:p>
+            <a:fld id="{5ECE0F15-BD04-4B70-8AC1-6501C07CDE78}" type="slidenum">
+              <a:rPr lang="fr-CH" smtClean="0"/>
+              <a:t>5</a:t>
+            </a:fld>
+            <a:endParaRPr lang="fr-CH"/>
+          </a:p>
+        </p:txBody>
+      </p:sp>
     </p:spTree>
     <p:extLst>
       <p:ext uri="{BB962C8B-B14F-4D97-AF65-F5344CB8AC3E}">
@@ -6841,7 +8718,7 @@
         </p:blipFill>
         <p:spPr>
           <a:xfrm>
-            <a:off x="1372835" y="1505330"/>
+            <a:off x="1934309" y="1380661"/>
             <a:ext cx="6833319" cy="4843263"/>
           </a:xfrm>
           <a:prstGeom prst="rect">
@@ -6849,6 +8726,66 @@
           </a:prstGeom>
         </p:spPr>
       </p:pic>
+      <p:sp>
+        <p:nvSpPr>
+          <p:cNvPr id="3" name="Espace réservé du pied de page 2"/>
+          <p:cNvSpPr>
+            <a:spLocks noGrp="1"/>
+          </p:cNvSpPr>
+          <p:nvPr>
+            <p:ph type="ftr" sz="quarter" idx="11"/>
+          </p:nvPr>
+        </p:nvSpPr>
+        <p:spPr/>
+        <p:txBody>
+          <a:bodyPr/>
+          <a:lstStyle/>
+          <a:p>
+            <a:r>
+              <a:rPr lang="fr-CH" dirty="0" smtClean="0"/>
+              <a:t>Thierry </a:t>
+            </a:r>
+            <a:r>
+              <a:rPr lang="fr-CH" dirty="0" err="1" smtClean="0"/>
+              <a:t>Koetschet</a:t>
+            </a:r>
+            <a:r>
+              <a:rPr lang="fr-CH" dirty="0" smtClean="0"/>
+              <a:t> </a:t>
+            </a:r>
+          </a:p>
+          <a:p>
+            <a:r>
+              <a:rPr lang="fr-CH" dirty="0" smtClean="0"/>
+              <a:t>SI-CA2a</a:t>
+            </a:r>
+            <a:endParaRPr lang="fr-CH" dirty="0"/>
+          </a:p>
+        </p:txBody>
+      </p:sp>
+      <p:sp>
+        <p:nvSpPr>
+          <p:cNvPr id="6" name="Espace réservé du numéro de diapositive 5"/>
+          <p:cNvSpPr>
+            <a:spLocks noGrp="1"/>
+          </p:cNvSpPr>
+          <p:nvPr>
+            <p:ph type="sldNum" sz="quarter" idx="12"/>
+          </p:nvPr>
+        </p:nvSpPr>
+        <p:spPr/>
+        <p:txBody>
+          <a:bodyPr/>
+          <a:lstStyle/>
+          <a:p>
+            <a:fld id="{5ECE0F15-BD04-4B70-8AC1-6501C07CDE78}" type="slidenum">
+              <a:rPr lang="fr-CH" smtClean="0"/>
+              <a:t>6</a:t>
+            </a:fld>
+            <a:endParaRPr lang="fr-CH"/>
+          </a:p>
+        </p:txBody>
+      </p:sp>
     </p:spTree>
     <p:extLst>
       <p:ext uri="{BB962C8B-B14F-4D97-AF65-F5344CB8AC3E}">
@@ -6909,21 +8846,88 @@
           </a:p>
         </p:txBody>
       </p:sp>
-      <p:sp>
-        <p:nvSpPr>
-          <p:cNvPr id="3" name="Espace réservé du contenu 2"/>
-          <p:cNvSpPr>
-            <a:spLocks noGrp="1"/>
-          </p:cNvSpPr>
+      <p:pic>
+        <p:nvPicPr>
+          <p:cNvPr id="7" name="Espace réservé du contenu 6"/>
+          <p:cNvPicPr>
+            <a:picLocks noGrp="1" noChangeAspect="1"/>
+          </p:cNvPicPr>
           <p:nvPr>
             <p:ph idx="1"/>
           </p:nvPr>
-        </p:nvSpPr>
-        <p:spPr/>
-        <p:txBody>
-          <a:bodyPr/>
-          <a:lstStyle/>
-          <a:p>
+        </p:nvPicPr>
+        <p:blipFill>
+          <a:blip r:embed="rId2"/>
+          <a:stretch>
+            <a:fillRect/>
+          </a:stretch>
+        </p:blipFill>
+        <p:spPr>
+          <a:xfrm>
+            <a:off x="2437897" y="1270000"/>
+            <a:ext cx="6152766" cy="5228811"/>
+          </a:xfrm>
+          <a:prstGeom prst="rect">
+            <a:avLst/>
+          </a:prstGeom>
+        </p:spPr>
+      </p:pic>
+      <p:sp>
+        <p:nvSpPr>
+          <p:cNvPr id="8" name="Espace réservé du pied de page 7"/>
+          <p:cNvSpPr>
+            <a:spLocks noGrp="1"/>
+          </p:cNvSpPr>
+          <p:nvPr>
+            <p:ph type="ftr" sz="quarter" idx="11"/>
+          </p:nvPr>
+        </p:nvSpPr>
+        <p:spPr/>
+        <p:txBody>
+          <a:bodyPr/>
+          <a:lstStyle/>
+          <a:p>
+            <a:r>
+              <a:rPr lang="fr-CH" dirty="0" smtClean="0"/>
+              <a:t>Thierry </a:t>
+            </a:r>
+            <a:r>
+              <a:rPr lang="fr-CH" dirty="0" err="1" smtClean="0"/>
+              <a:t>Koetschet</a:t>
+            </a:r>
+            <a:r>
+              <a:rPr lang="fr-CH" dirty="0" smtClean="0"/>
+              <a:t> </a:t>
+            </a:r>
+          </a:p>
+          <a:p>
+            <a:r>
+              <a:rPr lang="fr-CH" dirty="0" smtClean="0"/>
+              <a:t>SI-CA2a</a:t>
+            </a:r>
+            <a:endParaRPr lang="fr-CH" dirty="0"/>
+          </a:p>
+        </p:txBody>
+      </p:sp>
+      <p:sp>
+        <p:nvSpPr>
+          <p:cNvPr id="9" name="Espace réservé du numéro de diapositive 8"/>
+          <p:cNvSpPr>
+            <a:spLocks noGrp="1"/>
+          </p:cNvSpPr>
+          <p:nvPr>
+            <p:ph type="sldNum" sz="quarter" idx="12"/>
+          </p:nvPr>
+        </p:nvSpPr>
+        <p:spPr/>
+        <p:txBody>
+          <a:bodyPr/>
+          <a:lstStyle/>
+          <a:p>
+            <a:fld id="{5ECE0F15-BD04-4B70-8AC1-6501C07CDE78}" type="slidenum">
+              <a:rPr lang="fr-CH" smtClean="0"/>
+              <a:t>7</a:t>
+            </a:fld>
             <a:endParaRPr lang="fr-CH"/>
           </a:p>
         </p:txBody>
@@ -6988,21 +8992,88 @@
           </a:p>
         </p:txBody>
       </p:sp>
-      <p:sp>
-        <p:nvSpPr>
-          <p:cNvPr id="3" name="Espace réservé du contenu 2"/>
-          <p:cNvSpPr>
-            <a:spLocks noGrp="1"/>
-          </p:cNvSpPr>
+      <p:pic>
+        <p:nvPicPr>
+          <p:cNvPr id="5" name="Espace réservé du contenu 4"/>
+          <p:cNvPicPr>
+            <a:picLocks noGrp="1" noChangeAspect="1"/>
+          </p:cNvPicPr>
           <p:nvPr>
             <p:ph idx="1"/>
           </p:nvPr>
-        </p:nvSpPr>
-        <p:spPr/>
-        <p:txBody>
-          <a:bodyPr/>
-          <a:lstStyle/>
-          <a:p>
+        </p:nvPicPr>
+        <p:blipFill>
+          <a:blip r:embed="rId2"/>
+          <a:stretch>
+            <a:fillRect/>
+          </a:stretch>
+        </p:blipFill>
+        <p:spPr>
+          <a:xfrm>
+            <a:off x="2113392" y="1360425"/>
+            <a:ext cx="6818940" cy="5250913"/>
+          </a:xfrm>
+          <a:prstGeom prst="rect">
+            <a:avLst/>
+          </a:prstGeom>
+        </p:spPr>
+      </p:pic>
+      <p:sp>
+        <p:nvSpPr>
+          <p:cNvPr id="6" name="Espace réservé du pied de page 5"/>
+          <p:cNvSpPr>
+            <a:spLocks noGrp="1"/>
+          </p:cNvSpPr>
+          <p:nvPr>
+            <p:ph type="ftr" sz="quarter" idx="11"/>
+          </p:nvPr>
+        </p:nvSpPr>
+        <p:spPr/>
+        <p:txBody>
+          <a:bodyPr/>
+          <a:lstStyle/>
+          <a:p>
+            <a:r>
+              <a:rPr lang="fr-CH" dirty="0" smtClean="0"/>
+              <a:t>Thierry </a:t>
+            </a:r>
+            <a:r>
+              <a:rPr lang="fr-CH" dirty="0" err="1" smtClean="0"/>
+              <a:t>Koetschet</a:t>
+            </a:r>
+            <a:r>
+              <a:rPr lang="fr-CH" dirty="0" smtClean="0"/>
+              <a:t> </a:t>
+            </a:r>
+          </a:p>
+          <a:p>
+            <a:r>
+              <a:rPr lang="fr-CH" dirty="0" smtClean="0"/>
+              <a:t>SI-CA2a</a:t>
+            </a:r>
+            <a:endParaRPr lang="fr-CH" dirty="0"/>
+          </a:p>
+        </p:txBody>
+      </p:sp>
+      <p:sp>
+        <p:nvSpPr>
+          <p:cNvPr id="7" name="Espace réservé du numéro de diapositive 6"/>
+          <p:cNvSpPr>
+            <a:spLocks noGrp="1"/>
+          </p:cNvSpPr>
+          <p:nvPr>
+            <p:ph type="sldNum" sz="quarter" idx="12"/>
+          </p:nvPr>
+        </p:nvSpPr>
+        <p:spPr/>
+        <p:txBody>
+          <a:bodyPr/>
+          <a:lstStyle/>
+          <a:p>
+            <a:fld id="{5ECE0F15-BD04-4B70-8AC1-6501C07CDE78}" type="slidenum">
+              <a:rPr lang="fr-CH" smtClean="0"/>
+              <a:t>8</a:t>
+            </a:fld>
             <a:endParaRPr lang="fr-CH"/>
           </a:p>
         </p:txBody>
@@ -7069,23 +9140,107 @@
       </p:sp>
       <p:sp>
         <p:nvSpPr>
-          <p:cNvPr id="3" name="Espace réservé du contenu 2"/>
-          <p:cNvSpPr>
-            <a:spLocks noGrp="1"/>
-          </p:cNvSpPr>
+          <p:cNvPr id="5" name="Espace réservé du pied de page 4"/>
+          <p:cNvSpPr>
+            <a:spLocks noGrp="1"/>
+          </p:cNvSpPr>
+          <p:nvPr>
+            <p:ph type="ftr" sz="quarter" idx="11"/>
+          </p:nvPr>
+        </p:nvSpPr>
+        <p:spPr/>
+        <p:txBody>
+          <a:bodyPr/>
+          <a:lstStyle/>
+          <a:p>
+            <a:r>
+              <a:rPr lang="fr-CH" dirty="0" smtClean="0"/>
+              <a:t>Thierry </a:t>
+            </a:r>
+            <a:r>
+              <a:rPr lang="fr-CH" dirty="0" err="1" smtClean="0"/>
+              <a:t>Koetschet</a:t>
+            </a:r>
+            <a:r>
+              <a:rPr lang="fr-CH" dirty="0" smtClean="0"/>
+              <a:t> </a:t>
+            </a:r>
+          </a:p>
+          <a:p>
+            <a:r>
+              <a:rPr lang="fr-CH" dirty="0" smtClean="0"/>
+              <a:t>SI-CA2a</a:t>
+            </a:r>
+            <a:endParaRPr lang="fr-CH" dirty="0"/>
+          </a:p>
+        </p:txBody>
+      </p:sp>
+      <p:sp>
+        <p:nvSpPr>
+          <p:cNvPr id="6" name="Espace réservé du numéro de diapositive 5"/>
+          <p:cNvSpPr>
+            <a:spLocks noGrp="1"/>
+          </p:cNvSpPr>
+          <p:nvPr>
+            <p:ph type="sldNum" sz="quarter" idx="12"/>
+          </p:nvPr>
+        </p:nvSpPr>
+        <p:spPr/>
+        <p:txBody>
+          <a:bodyPr/>
+          <a:lstStyle/>
+          <a:p>
+            <a:fld id="{5ECE0F15-BD04-4B70-8AC1-6501C07CDE78}" type="slidenum">
+              <a:rPr lang="fr-CH" smtClean="0"/>
+              <a:t>9</a:t>
+            </a:fld>
+            <a:endParaRPr lang="fr-CH"/>
+          </a:p>
+        </p:txBody>
+      </p:sp>
+      <p:pic>
+        <p:nvPicPr>
+          <p:cNvPr id="1026" name="Picture 2" descr="Artwork - Apache Cordova"/>
+          <p:cNvPicPr>
+            <a:picLocks noGrp="1" noChangeAspect="1" noChangeArrowheads="1"/>
+          </p:cNvPicPr>
           <p:nvPr>
             <p:ph idx="1"/>
           </p:nvPr>
-        </p:nvSpPr>
-        <p:spPr/>
-        <p:txBody>
-          <a:bodyPr/>
-          <a:lstStyle/>
-          <a:p>
-            <a:endParaRPr lang="fr-CH"/>
-          </a:p>
-        </p:txBody>
-      </p:sp>
+        </p:nvPicPr>
+        <p:blipFill>
+          <a:blip r:embed="rId2">
+            <a:extLst>
+              <a:ext uri="{28A0092B-C50C-407E-A947-70E740481C1C}">
+                <a14:useLocalDpi xmlns:a14="http://schemas.microsoft.com/office/drawing/2010/main" val="0"/>
+              </a:ext>
+            </a:extLst>
+          </a:blip>
+          <a:srcRect/>
+          <a:stretch>
+            <a:fillRect/>
+          </a:stretch>
+        </p:blipFill>
+        <p:spPr bwMode="auto">
+          <a:xfrm>
+            <a:off x="916222" y="1930400"/>
+            <a:ext cx="8118892" cy="3624505"/>
+          </a:xfrm>
+          <a:prstGeom prst="rect">
+            <a:avLst/>
+          </a:prstGeom>
+          <a:noFill/>
+          <a:extLst>
+            <a:ext uri="{909E8E84-426E-40DD-AFC4-6F175D3DCCD1}">
+              <a14:hiddenFill xmlns:a14="http://schemas.microsoft.com/office/drawing/2010/main">
+                <a:solidFill>
+                  <a:srgbClr val="FFFFFF"/>
+                </a:solidFill>
+              </a14:hiddenFill>
+            </a:ext>
+          </a:extLst>
+        </p:spPr>
+      </p:pic>
     </p:spTree>
     <p:extLst>
       <p:ext uri="{BB962C8B-B14F-4D97-AF65-F5344CB8AC3E}">
@@ -7361,4 +9516,526 @@
     </a:ext>
   </a:extLst>
 </a:theme>
+</file>
+
+<file path=ppt/theme/theme2.xml><?xml version="1.0" encoding="utf-8"?>
+<a:theme xmlns:a="http://schemas.openxmlformats.org/drawingml/2006/main" name="Thème Office">
+  <a:themeElements>
+    <a:clrScheme name="Office">
+      <a:dk1>
+        <a:sysClr val="windowText" lastClr="000000"/>
+      </a:dk1>
+      <a:lt1>
+        <a:sysClr val="window" lastClr="FFFFFF"/>
+      </a:lt1>
+      <a:dk2>
+        <a:srgbClr val="44546A"/>
+      </a:dk2>
+      <a:lt2>
+        <a:srgbClr val="E7E6E6"/>
+      </a:lt2>
+      <a:accent1>
+        <a:srgbClr val="5B9BD5"/>
+      </a:accent1>
+      <a:accent2>
+        <a:srgbClr val="ED7D31"/>
+      </a:accent2>
+      <a:accent3>
+        <a:srgbClr val="A5A5A5"/>
+      </a:accent3>
+      <a:accent4>
+        <a:srgbClr val="FFC000"/>
+      </a:accent4>
+      <a:accent5>
+        <a:srgbClr val="4472C4"/>
+      </a:accent5>
+      <a:accent6>
+        <a:srgbClr val="70AD47"/>
+      </a:accent6>
+      <a:hlink>
+        <a:srgbClr val="0563C1"/>
+      </a:hlink>
+      <a:folHlink>
+        <a:srgbClr val="954F72"/>
+      </a:folHlink>
+    </a:clrScheme>
+    <a:fontScheme name="Office">
+      <a:majorFont>
+        <a:latin typeface="Calibri Light" panose="020F0302020204030204"/>
+        <a:ea typeface=""/>
+        <a:cs typeface=""/>
+        <a:font script="Jpan" typeface="游ゴシック Light"/>
+        <a:font script="Hang" typeface="맑은 고딕"/>
+        <a:font script="Hans" typeface="等线 Light"/>
+        <a:font script="Hant" typeface="新細明體"/>
+        <a:font script="Arab" typeface="Times New Roman"/>
+        <a:font script="Hebr" typeface="Times New Roman"/>
+        <a:font script="Thai" typeface="Angsana New"/>
+        <a:font script="Ethi" typeface="Nyala"/>
+        <a:font script="Beng" typeface="Vrinda"/>
+        <a:font script="Gujr" typeface="Shruti"/>
+        <a:font script="Khmr" typeface="MoolBoran"/>
+        <a:font script="Knda" typeface="Tunga"/>
+        <a:font script="Guru" typeface="Raavi"/>
+        <a:font script="Cans" typeface="Euphemia"/>
+        <a:font script="Cher" typeface="Plantagenet Cherokee"/>
+        <a:font script="Yiii" typeface="Microsoft Yi Baiti"/>
+        <a:font script="Tibt" typeface="Microsoft Himalaya"/>
+        <a:font script="Thaa" typeface="MV Boli"/>
+        <a:font script="Deva" typeface="Mangal"/>
+        <a:font script="Telu" typeface="Gautami"/>
+        <a:font script="Taml" typeface="Latha"/>
+        <a:font script="Syrc" typeface="Estrangelo Edessa"/>
+        <a:font script="Orya" typeface="Kalinga"/>
+        <a:font script="Mlym" typeface="Kartika"/>
+        <a:font script="Laoo" typeface="DokChampa"/>
+        <a:font script="Sinh" typeface="Iskoola Pota"/>
+        <a:font script="Mong" typeface="Mongolian Baiti"/>
+        <a:font script="Viet" typeface="Times New Roman"/>
+        <a:font script="Uigh" typeface="Microsoft Uighur"/>
+        <a:font script="Geor" typeface="Sylfaen"/>
+      </a:majorFont>
+      <a:minorFont>
+        <a:latin typeface="Calibri" panose="020F0502020204030204"/>
+        <a:ea typeface=""/>
+        <a:cs typeface=""/>
+        <a:font script="Jpan" typeface="游ゴシック"/>
+        <a:font script="Hang" typeface="맑은 고딕"/>
+        <a:font script="Hans" typeface="等线"/>
+        <a:font script="Hant" typeface="新細明體"/>
+        <a:font script="Arab" typeface="Arial"/>
+        <a:font script="Hebr" typeface="Arial"/>
+        <a:font script="Thai" typeface="Cordia New"/>
+        <a:font script="Ethi" typeface="Nyala"/>
+        <a:font script="Beng" typeface="Vrinda"/>
+        <a:font script="Gujr" typeface="Shruti"/>
+        <a:font script="Khmr" typeface="DaunPenh"/>
+        <a:font script="Knda" typeface="Tunga"/>
+        <a:font script="Guru" typeface="Raavi"/>
+        <a:font script="Cans" typeface="Euphemia"/>
+        <a:font script="Cher" typeface="Plantagenet Cherokee"/>
+        <a:font script="Yiii" typeface="Microsoft Yi Baiti"/>
+        <a:font script="Tibt" typeface="Microsoft Himalaya"/>
+        <a:font script="Thaa" typeface="MV Boli"/>
+        <a:font script="Deva" typeface="Mangal"/>
+        <a:font script="Telu" typeface="Gautami"/>
+        <a:font script="Taml" typeface="Latha"/>
+        <a:font script="Syrc" typeface="Estrangelo Edessa"/>
+        <a:font script="Orya" typeface="Kalinga"/>
+        <a:font script="Mlym" typeface="Kartika"/>
+        <a:font script="Laoo" typeface="DokChampa"/>
+        <a:font script="Sinh" typeface="Iskoola Pota"/>
+        <a:font script="Mong" typeface="Mongolian Baiti"/>
+        <a:font script="Viet" typeface="Arial"/>
+        <a:font script="Uigh" typeface="Microsoft Uighur"/>
+        <a:font script="Geor" typeface="Sylfaen"/>
+      </a:minorFont>
+    </a:fontScheme>
+    <a:fmtScheme name="Office">
+      <a:fillStyleLst>
+        <a:solidFill>
+          <a:schemeClr val="phClr"/>
+        </a:solidFill>
+        <a:gradFill rotWithShape="1">
+          <a:gsLst>
+            <a:gs pos="0">
+              <a:schemeClr val="phClr">
+                <a:lumMod val="110000"/>
+                <a:satMod val="105000"/>
+                <a:tint val="67000"/>
+              </a:schemeClr>
+            </a:gs>
+            <a:gs pos="50000">
+              <a:schemeClr val="phClr">
+                <a:lumMod val="105000"/>
+                <a:satMod val="103000"/>
+                <a:tint val="73000"/>
+              </a:schemeClr>
+            </a:gs>
+            <a:gs pos="100000">
+              <a:schemeClr val="phClr">
+                <a:lumMod val="105000"/>
+                <a:satMod val="109000"/>
+                <a:tint val="81000"/>
+              </a:schemeClr>
+            </a:gs>
+          </a:gsLst>
+          <a:lin ang="5400000" scaled="0"/>
+        </a:gradFill>
+        <a:gradFill rotWithShape="1">
+          <a:gsLst>
+            <a:gs pos="0">
+              <a:schemeClr val="phClr">
+                <a:satMod val="103000"/>
+                <a:lumMod val="102000"/>
+                <a:tint val="94000"/>
+              </a:schemeClr>
+            </a:gs>
+            <a:gs pos="50000">
+              <a:schemeClr val="phClr">
+                <a:satMod val="110000"/>
+                <a:lumMod val="100000"/>
+                <a:shade val="100000"/>
+              </a:schemeClr>
+            </a:gs>
+            <a:gs pos="100000">
+              <a:schemeClr val="phClr">
+                <a:lumMod val="99000"/>
+                <a:satMod val="120000"/>
+                <a:shade val="78000"/>
+              </a:schemeClr>
+            </a:gs>
+          </a:gsLst>
+          <a:lin ang="5400000" scaled="0"/>
+        </a:gradFill>
+      </a:fillStyleLst>
+      <a:lnStyleLst>
+        <a:ln w="6350" cap="flat" cmpd="sng" algn="ctr">
+          <a:solidFill>
+            <a:schemeClr val="phClr"/>
+          </a:solidFill>
+          <a:prstDash val="solid"/>
+          <a:miter lim="800000"/>
+        </a:ln>
+        <a:ln w="12700" cap="flat" cmpd="sng" algn="ctr">
+          <a:solidFill>
+            <a:schemeClr val="phClr"/>
+          </a:solidFill>
+          <a:prstDash val="solid"/>
+          <a:miter lim="800000"/>
+        </a:ln>
+        <a:ln w="19050" cap="flat" cmpd="sng" algn="ctr">
+          <a:solidFill>
+            <a:schemeClr val="phClr"/>
+          </a:solidFill>
+          <a:prstDash val="solid"/>
+          <a:miter lim="800000"/>
+        </a:ln>
+      </a:lnStyleLst>
+      <a:effectStyleLst>
+        <a:effectStyle>
+          <a:effectLst/>
+        </a:effectStyle>
+        <a:effectStyle>
+          <a:effectLst/>
+        </a:effectStyle>
+        <a:effectStyle>
+          <a:effectLst>
+            <a:outerShdw blurRad="57150" dist="19050" dir="5400000" algn="ctr" rotWithShape="0">
+              <a:srgbClr val="000000">
+                <a:alpha val="63000"/>
+              </a:srgbClr>
+            </a:outerShdw>
+          </a:effectLst>
+        </a:effectStyle>
+      </a:effectStyleLst>
+      <a:bgFillStyleLst>
+        <a:solidFill>
+          <a:schemeClr val="phClr"/>
+        </a:solidFill>
+        <a:solidFill>
+          <a:schemeClr val="phClr">
+            <a:tint val="95000"/>
+            <a:satMod val="170000"/>
+          </a:schemeClr>
+        </a:solidFill>
+        <a:gradFill rotWithShape="1">
+          <a:gsLst>
+            <a:gs pos="0">
+              <a:schemeClr val="phClr">
+                <a:tint val="93000"/>
+                <a:satMod val="150000"/>
+                <a:shade val="98000"/>
+                <a:lumMod val="102000"/>
+              </a:schemeClr>
+            </a:gs>
+            <a:gs pos="50000">
+              <a:schemeClr val="phClr">
+                <a:tint val="98000"/>
+                <a:satMod val="130000"/>
+                <a:shade val="90000"/>
+                <a:lumMod val="103000"/>
+              </a:schemeClr>
+            </a:gs>
+            <a:gs pos="100000">
+              <a:schemeClr val="phClr">
+                <a:shade val="63000"/>
+                <a:satMod val="120000"/>
+              </a:schemeClr>
+            </a:gs>
+          </a:gsLst>
+          <a:lin ang="5400000" scaled="0"/>
+        </a:gradFill>
+      </a:bgFillStyleLst>
+    </a:fmtScheme>
+  </a:themeElements>
+  <a:objectDefaults/>
+  <a:extraClrSchemeLst/>
+  <a:extLst>
+    <a:ext uri="{05A4C25C-085E-4340-85A3-A5531E510DB2}">
+      <thm15:themeFamily xmlns:thm15="http://schemas.microsoft.com/office/thememl/2012/main" name="Office Theme" id="{62F939B6-93AF-4DB8-9C6B-D6C7DFDC589F}" vid="{4A3C46E8-61CC-4603-A589-7422A47A8E4A}"/>
+    </a:ext>
+  </a:extLst>
+</a:theme>
+</file>
+
+<file path=ppt/theme/theme3.xml><?xml version="1.0" encoding="utf-8"?>
+<a:theme xmlns:a="http://schemas.openxmlformats.org/drawingml/2006/main" name="Thème Office">
+  <a:themeElements>
+    <a:clrScheme name="Office">
+      <a:dk1>
+        <a:sysClr val="windowText" lastClr="000000"/>
+      </a:dk1>
+      <a:lt1>
+        <a:sysClr val="window" lastClr="FFFFFF"/>
+      </a:lt1>
+      <a:dk2>
+        <a:srgbClr val="44546A"/>
+      </a:dk2>
+      <a:lt2>
+        <a:srgbClr val="E7E6E6"/>
+      </a:lt2>
+      <a:accent1>
+        <a:srgbClr val="5B9BD5"/>
+      </a:accent1>
+      <a:accent2>
+        <a:srgbClr val="ED7D31"/>
+      </a:accent2>
+      <a:accent3>
+        <a:srgbClr val="A5A5A5"/>
+      </a:accent3>
+      <a:accent4>
+        <a:srgbClr val="FFC000"/>
+      </a:accent4>
+      <a:accent5>
+        <a:srgbClr val="4472C4"/>
+      </a:accent5>
+      <a:accent6>
+        <a:srgbClr val="70AD47"/>
+      </a:accent6>
+      <a:hlink>
+        <a:srgbClr val="0563C1"/>
+      </a:hlink>
+      <a:folHlink>
+        <a:srgbClr val="954F72"/>
+      </a:folHlink>
+    </a:clrScheme>
+    <a:fontScheme name="Office">
+      <a:majorFont>
+        <a:latin typeface="Calibri Light" panose="020F0302020204030204"/>
+        <a:ea typeface=""/>
+        <a:cs typeface=""/>
+        <a:font script="Jpan" typeface="游ゴシック Light"/>
+        <a:font script="Hang" typeface="맑은 고딕"/>
+        <a:font script="Hans" typeface="等线 Light"/>
+        <a:font script="Hant" typeface="新細明體"/>
+        <a:font script="Arab" typeface="Times New Roman"/>
+        <a:font script="Hebr" typeface="Times New Roman"/>
+        <a:font script="Thai" typeface="Angsana New"/>
+        <a:font script="Ethi" typeface="Nyala"/>
+        <a:font script="Beng" typeface="Vrinda"/>
+        <a:font script="Gujr" typeface="Shruti"/>
+        <a:font script="Khmr" typeface="MoolBoran"/>
+        <a:font script="Knda" typeface="Tunga"/>
+        <a:font script="Guru" typeface="Raavi"/>
+        <a:font script="Cans" typeface="Euphemia"/>
+        <a:font script="Cher" typeface="Plantagenet Cherokee"/>
+        <a:font script="Yiii" typeface="Microsoft Yi Baiti"/>
+        <a:font script="Tibt" typeface="Microsoft Himalaya"/>
+        <a:font script="Thaa" typeface="MV Boli"/>
+        <a:font script="Deva" typeface="Mangal"/>
+        <a:font script="Telu" typeface="Gautami"/>
+        <a:font script="Taml" typeface="Latha"/>
+        <a:font script="Syrc" typeface="Estrangelo Edessa"/>
+        <a:font script="Orya" typeface="Kalinga"/>
+        <a:font script="Mlym" typeface="Kartika"/>
+        <a:font script="Laoo" typeface="DokChampa"/>
+        <a:font script="Sinh" typeface="Iskoola Pota"/>
+        <a:font script="Mong" typeface="Mongolian Baiti"/>
+        <a:font script="Viet" typeface="Times New Roman"/>
+        <a:font script="Uigh" typeface="Microsoft Uighur"/>
+        <a:font script="Geor" typeface="Sylfaen"/>
+      </a:majorFont>
+      <a:minorFont>
+        <a:latin typeface="Calibri" panose="020F0502020204030204"/>
+        <a:ea typeface=""/>
+        <a:cs typeface=""/>
+        <a:font script="Jpan" typeface="游ゴシック"/>
+        <a:font script="Hang" typeface="맑은 고딕"/>
+        <a:font script="Hans" typeface="等线"/>
+        <a:font script="Hant" typeface="新細明體"/>
+        <a:font script="Arab" typeface="Arial"/>
+        <a:font script="Hebr" typeface="Arial"/>
+        <a:font script="Thai" typeface="Cordia New"/>
+        <a:font script="Ethi" typeface="Nyala"/>
+        <a:font script="Beng" typeface="Vrinda"/>
+        <a:font script="Gujr" typeface="Shruti"/>
+        <a:font script="Khmr" typeface="DaunPenh"/>
+        <a:font script="Knda" typeface="Tunga"/>
+        <a:font script="Guru" typeface="Raavi"/>
+        <a:font script="Cans" typeface="Euphemia"/>
+        <a:font script="Cher" typeface="Plantagenet Cherokee"/>
+        <a:font script="Yiii" typeface="Microsoft Yi Baiti"/>
+        <a:font script="Tibt" typeface="Microsoft Himalaya"/>
+        <a:font script="Thaa" typeface="MV Boli"/>
+        <a:font script="Deva" typeface="Mangal"/>
+        <a:font script="Telu" typeface="Gautami"/>
+        <a:font script="Taml" typeface="Latha"/>
+        <a:font script="Syrc" typeface="Estrangelo Edessa"/>
+        <a:font script="Orya" typeface="Kalinga"/>
+        <a:font script="Mlym" typeface="Kartika"/>
+        <a:font script="Laoo" typeface="DokChampa"/>
+        <a:font script="Sinh" typeface="Iskoola Pota"/>
+        <a:font script="Mong" typeface="Mongolian Baiti"/>
+        <a:font script="Viet" typeface="Arial"/>
+        <a:font script="Uigh" typeface="Microsoft Uighur"/>
+        <a:font script="Geor" typeface="Sylfaen"/>
+      </a:minorFont>
+    </a:fontScheme>
+    <a:fmtScheme name="Office">
+      <a:fillStyleLst>
+        <a:solidFill>
+          <a:schemeClr val="phClr"/>
+        </a:solidFill>
+        <a:gradFill rotWithShape="1">
+          <a:gsLst>
+            <a:gs pos="0">
+              <a:schemeClr val="phClr">
+                <a:lumMod val="110000"/>
+                <a:satMod val="105000"/>
+                <a:tint val="67000"/>
+              </a:schemeClr>
+            </a:gs>
+            <a:gs pos="50000">
+              <a:schemeClr val="phClr">
+                <a:lumMod val="105000"/>
+                <a:satMod val="103000"/>
+                <a:tint val="73000"/>
+              </a:schemeClr>
+            </a:gs>
+            <a:gs pos="100000">
+              <a:schemeClr val="phClr">
+                <a:lumMod val="105000"/>
+                <a:satMod val="109000"/>
+                <a:tint val="81000"/>
+              </a:schemeClr>
+            </a:gs>
+          </a:gsLst>
+          <a:lin ang="5400000" scaled="0"/>
+        </a:gradFill>
+        <a:gradFill rotWithShape="1">
+          <a:gsLst>
+            <a:gs pos="0">
+              <a:schemeClr val="phClr">
+                <a:satMod val="103000"/>
+                <a:lumMod val="102000"/>
+                <a:tint val="94000"/>
+              </a:schemeClr>
+            </a:gs>
+            <a:gs pos="50000">
+              <a:schemeClr val="phClr">
+                <a:satMod val="110000"/>
+                <a:lumMod val="100000"/>
+                <a:shade val="100000"/>
+              </a:schemeClr>
+            </a:gs>
+            <a:gs pos="100000">
+              <a:schemeClr val="phClr">
+                <a:lumMod val="99000"/>
+                <a:satMod val="120000"/>
+                <a:shade val="78000"/>
+              </a:schemeClr>
+            </a:gs>
+          </a:gsLst>
+          <a:lin ang="5400000" scaled="0"/>
+        </a:gradFill>
+      </a:fillStyleLst>
+      <a:lnStyleLst>
+        <a:ln w="6350" cap="flat" cmpd="sng" algn="ctr">
+          <a:solidFill>
+            <a:schemeClr val="phClr"/>
+          </a:solidFill>
+          <a:prstDash val="solid"/>
+          <a:miter lim="800000"/>
+        </a:ln>
+        <a:ln w="12700" cap="flat" cmpd="sng" algn="ctr">
+          <a:solidFill>
+            <a:schemeClr val="phClr"/>
+          </a:solidFill>
+          <a:prstDash val="solid"/>
+          <a:miter lim="800000"/>
+        </a:ln>
+        <a:ln w="19050" cap="flat" cmpd="sng" algn="ctr">
+          <a:solidFill>
+            <a:schemeClr val="phClr"/>
+          </a:solidFill>
+          <a:prstDash val="solid"/>
+          <a:miter lim="800000"/>
+        </a:ln>
+      </a:lnStyleLst>
+      <a:effectStyleLst>
+        <a:effectStyle>
+          <a:effectLst/>
+        </a:effectStyle>
+        <a:effectStyle>
+          <a:effectLst/>
+        </a:effectStyle>
+        <a:effectStyle>
+          <a:effectLst>
+            <a:outerShdw blurRad="57150" dist="19050" dir="5400000" algn="ctr" rotWithShape="0">
+              <a:srgbClr val="000000">
+                <a:alpha val="63000"/>
+              </a:srgbClr>
+            </a:outerShdw>
+          </a:effectLst>
+        </a:effectStyle>
+      </a:effectStyleLst>
+      <a:bgFillStyleLst>
+        <a:solidFill>
+          <a:schemeClr val="phClr"/>
+        </a:solidFill>
+        <a:solidFill>
+          <a:schemeClr val="phClr">
+            <a:tint val="95000"/>
+            <a:satMod val="170000"/>
+          </a:schemeClr>
+        </a:solidFill>
+        <a:gradFill rotWithShape="1">
+          <a:gsLst>
+            <a:gs pos="0">
+              <a:schemeClr val="phClr">
+                <a:tint val="93000"/>
+                <a:satMod val="150000"/>
+                <a:shade val="98000"/>
+                <a:lumMod val="102000"/>
+              </a:schemeClr>
+            </a:gs>
+            <a:gs pos="50000">
+              <a:schemeClr val="phClr">
+                <a:tint val="98000"/>
+                <a:satMod val="130000"/>
+                <a:shade val="90000"/>
+                <a:lumMod val="103000"/>
+              </a:schemeClr>
+            </a:gs>
+            <a:gs pos="100000">
+              <a:schemeClr val="phClr">
+                <a:shade val="63000"/>
+                <a:satMod val="120000"/>
+              </a:schemeClr>
+            </a:gs>
+          </a:gsLst>
+          <a:lin ang="5400000" scaled="0"/>
+        </a:gradFill>
+      </a:bgFillStyleLst>
+    </a:fmtScheme>
+  </a:themeElements>
+  <a:objectDefaults/>
+  <a:extraClrSchemeLst/>
+  <a:extLst>
+    <a:ext uri="{05A4C25C-085E-4340-85A3-A5531E510DB2}">
+      <thm15:themeFamily xmlns:thm15="http://schemas.microsoft.com/office/thememl/2012/main" name="Office Theme" id="{62F939B6-93AF-4DB8-9C6B-D6C7DFDC589F}" vid="{4A3C46E8-61CC-4603-A589-7422A47A8E4A}"/>
+    </a:ext>
+  </a:extLst>
+</a:theme>
 </file>
</xml_diff>